<commit_message>
Création de doc antérieur +  liens API + Diapo + Diagramme <3
</commit_message>
<xml_diff>
--- a/Diaporama/DIAPO_01.pptx
+++ b/Diaporama/DIAPO_01.pptx
@@ -16724,14 +16724,14 @@
           <p:nvPr>
             <p:extLst>
               <p:ext uri="{D42A27DB-BD31-4B8C-83A1-F6EECF244321}">
-                <p14:modId xmlns:p14="http://schemas.microsoft.com/office/powerpoint/2010/main" val="3450002281"/>
+                <p14:modId xmlns:p14="http://schemas.microsoft.com/office/powerpoint/2010/main" val="2265459897"/>
               </p:ext>
             </p:extLst>
           </p:nvPr>
         </p:nvGraphicFramePr>
         <p:xfrm>
-          <a:off x="3810467" y="2665912"/>
-          <a:ext cx="8128000" cy="3677920"/>
+          <a:off x="1696441" y="2650921"/>
+          <a:ext cx="8128000" cy="3961360"/>
         </p:xfrm>
         <a:graphic>
           <a:graphicData uri="http://schemas.openxmlformats.org/drawingml/2006/table">
@@ -16755,7 +16755,7 @@
                   </a:extLst>
                 </a:gridCol>
               </a:tblGrid>
-              <a:tr h="370840">
+              <a:tr h="399419">
                 <a:tc>
                   <a:txBody>
                     <a:bodyPr/>
@@ -16788,7 +16788,7 @@
                   </a:ext>
                 </a:extLst>
               </a:tr>
-              <a:tr h="370840">
+              <a:tr h="689408">
                 <a:tc>
                   <a:txBody>
                     <a:bodyPr/>
@@ -16821,7 +16821,7 @@
                   </a:ext>
                 </a:extLst>
               </a:tr>
-              <a:tr h="370840">
+              <a:tr h="689408">
                 <a:tc>
                   <a:txBody>
                     <a:bodyPr/>
@@ -16854,7 +16854,7 @@
                   </a:ext>
                 </a:extLst>
               </a:tr>
-              <a:tr h="370840">
+              <a:tr h="399419">
                 <a:tc>
                   <a:txBody>
                     <a:bodyPr/>
@@ -16887,7 +16887,7 @@
                   </a:ext>
                 </a:extLst>
               </a:tr>
-              <a:tr h="370840">
+              <a:tr h="984868">
                 <a:tc>
                   <a:txBody>
                     <a:bodyPr/>
@@ -16920,7 +16920,7 @@
                   </a:ext>
                 </a:extLst>
               </a:tr>
-              <a:tr h="370840">
+              <a:tr h="399419">
                 <a:tc>
                   <a:txBody>
                     <a:bodyPr/>
@@ -16953,7 +16953,7 @@
                   </a:ext>
                 </a:extLst>
               </a:tr>
-              <a:tr h="370840">
+              <a:tr h="399419">
                 <a:tc>
                   <a:txBody>
                     <a:bodyPr/>
@@ -16990,6 +16990,41 @@
           </a:graphicData>
         </a:graphic>
       </p:graphicFrame>
+      <p:sp>
+        <p:nvSpPr>
+          <p:cNvPr id="5" name="ZoneTexte 4">
+            <a:extLst>
+              <a:ext uri="{FF2B5EF4-FFF2-40B4-BE49-F238E27FC236}">
+                <a16:creationId xmlns:a16="http://schemas.microsoft.com/office/drawing/2014/main" id="{C36FCC54-CDEB-4891-96C5-4DC747AD8D98}"/>
+              </a:ext>
+            </a:extLst>
+          </p:cNvPr>
+          <p:cNvSpPr txBox="1"/>
+          <p:nvPr/>
+        </p:nvSpPr>
+        <p:spPr>
+          <a:xfrm>
+            <a:off x="1696441" y="2281589"/>
+            <a:ext cx="2731838" cy="369332"/>
+          </a:xfrm>
+          <a:prstGeom prst="rect">
+            <a:avLst/>
+          </a:prstGeom>
+          <a:noFill/>
+        </p:spPr>
+        <p:txBody>
+          <a:bodyPr wrap="none" rtlCol="0">
+            <a:spAutoFit/>
+          </a:bodyPr>
+          <a:lstStyle/>
+          <a:p>
+            <a:r>
+              <a:rPr lang="fr-FR" dirty="0"/>
+              <a:t>Consigne de stockage</a:t>
+            </a:r>
+          </a:p>
+        </p:txBody>
+      </p:sp>
     </p:spTree>
     <p:extLst>
       <p:ext uri="{BB962C8B-B14F-4D97-AF65-F5344CB8AC3E}">

</xml_diff>

<commit_message>
Maj du diapo, ajout de la présentation d'entreprise
</commit_message>
<xml_diff>
--- a/Diaporama/DIAPO_01.pptx
+++ b/Diaporama/DIAPO_01.pptx
@@ -3566,7 +3566,7 @@
           <a:p>
             <a:fld id="{2BE451C3-0FF4-47C4-B829-773ADF60F88C}" type="datetimeFigureOut">
               <a:rPr lang="en-US" smtClean="0"/>
-              <a:t>1/17/2020</a:t>
+              <a:t>1/21/2020</a:t>
             </a:fld>
             <a:endParaRPr lang="en-US" dirty="0"/>
           </a:p>
@@ -3781,7 +3781,7 @@
           <a:p>
             <a:fld id="{2BE451C3-0FF4-47C4-B829-773ADF60F88C}" type="datetimeFigureOut">
               <a:rPr lang="en-US" smtClean="0"/>
-              <a:t>1/17/2020</a:t>
+              <a:t>1/21/2020</a:t>
             </a:fld>
             <a:endParaRPr lang="en-US" dirty="0"/>
           </a:p>
@@ -4044,7 +4044,7 @@
           <a:p>
             <a:fld id="{2BE451C3-0FF4-47C4-B829-773ADF60F88C}" type="datetimeFigureOut">
               <a:rPr lang="en-US" smtClean="0"/>
-              <a:t>1/17/2020</a:t>
+              <a:t>1/21/2020</a:t>
             </a:fld>
             <a:endParaRPr lang="en-US" dirty="0"/>
           </a:p>
@@ -4225,7 +4225,7 @@
           <a:p>
             <a:fld id="{2BE451C3-0FF4-47C4-B829-773ADF60F88C}" type="datetimeFigureOut">
               <a:rPr lang="en-US" smtClean="0"/>
-              <a:t>1/17/2020</a:t>
+              <a:t>1/21/2020</a:t>
             </a:fld>
             <a:endParaRPr lang="en-US" dirty="0"/>
           </a:p>
@@ -4575,7 +4575,7 @@
           <a:p>
             <a:fld id="{2BE451C3-0FF4-47C4-B829-773ADF60F88C}" type="datetimeFigureOut">
               <a:rPr lang="en-US" smtClean="0"/>
-              <a:t>1/17/2020</a:t>
+              <a:t>1/21/2020</a:t>
             </a:fld>
             <a:endParaRPr lang="en-US" dirty="0"/>
           </a:p>
@@ -4857,7 +4857,7 @@
           <a:p>
             <a:fld id="{2BE451C3-0FF4-47C4-B829-773ADF60F88C}" type="datetimeFigureOut">
               <a:rPr lang="en-US" smtClean="0"/>
-              <a:t>1/17/2020</a:t>
+              <a:t>1/21/2020</a:t>
             </a:fld>
             <a:endParaRPr lang="en-US" dirty="0"/>
           </a:p>
@@ -5243,7 +5243,7 @@
           <a:p>
             <a:fld id="{2BE451C3-0FF4-47C4-B829-773ADF60F88C}" type="datetimeFigureOut">
               <a:rPr lang="en-US" smtClean="0"/>
-              <a:t>1/17/2020</a:t>
+              <a:t>1/21/2020</a:t>
             </a:fld>
             <a:endParaRPr lang="en-US" dirty="0"/>
           </a:p>
@@ -5368,7 +5368,7 @@
           <a:p>
             <a:fld id="{2BE451C3-0FF4-47C4-B829-773ADF60F88C}" type="datetimeFigureOut">
               <a:rPr lang="en-US" smtClean="0"/>
-              <a:t>1/17/2020</a:t>
+              <a:t>1/21/2020</a:t>
             </a:fld>
             <a:endParaRPr lang="en-US" dirty="0"/>
           </a:p>
@@ -5546,7 +5546,7 @@
           <a:p>
             <a:fld id="{2BE451C3-0FF4-47C4-B829-773ADF60F88C}" type="datetimeFigureOut">
               <a:rPr lang="en-US" smtClean="0"/>
-              <a:t>1/17/2020</a:t>
+              <a:t>1/21/2020</a:t>
             </a:fld>
             <a:endParaRPr lang="en-US" dirty="0"/>
           </a:p>
@@ -5907,7 +5907,7 @@
           <a:p>
             <a:fld id="{2BE451C3-0FF4-47C4-B829-773ADF60F88C}" type="datetimeFigureOut">
               <a:rPr lang="en-US" smtClean="0"/>
-              <a:t>1/17/2020</a:t>
+              <a:t>1/21/2020</a:t>
             </a:fld>
             <a:endParaRPr lang="en-US" dirty="0"/>
           </a:p>
@@ -6296,7 +6296,7 @@
           <a:p>
             <a:fld id="{2BE451C3-0FF4-47C4-B829-773ADF60F88C}" type="datetimeFigureOut">
               <a:rPr lang="en-US" smtClean="0"/>
-              <a:t>1/17/2020</a:t>
+              <a:t>1/21/2020</a:t>
             </a:fld>
             <a:endParaRPr lang="en-US" dirty="0"/>
           </a:p>
@@ -6590,7 +6590,7 @@
           <a:p>
             <a:fld id="{2BE451C3-0FF4-47C4-B829-773ADF60F88C}" type="datetimeFigureOut">
               <a:rPr lang="en-US" smtClean="0"/>
-              <a:t>1/17/2020</a:t>
+              <a:t>1/21/2020</a:t>
             </a:fld>
             <a:endParaRPr lang="en-US" dirty="0"/>
           </a:p>
@@ -7316,7 +7316,27 @@
                   <a:schemeClr val="tx1"/>
                 </a:solidFill>
               </a:rPr>
-              <a:t> : </a:t>
+              <a:t> :</a:t>
+            </a:r>
+          </a:p>
+          <a:p>
+            <a:pPr algn="l"/>
+            <a:r>
+              <a:rPr lang="en-US" dirty="0">
+                <a:ln>
+                  <a:solidFill>
+                    <a:srgbClr val="000000">
+                      <a:lumMod val="75000"/>
+                      <a:lumOff val="25000"/>
+                      <a:alpha val="10000"/>
+                    </a:srgbClr>
+                  </a:solidFill>
+                </a:ln>
+                <a:solidFill>
+                  <a:schemeClr val="tx1"/>
+                </a:solidFill>
+              </a:rPr>
+              <a:t> </a:t>
             </a:r>
             <a:r>
               <a:rPr lang="en-US" dirty="0" err="1">
@@ -9381,7 +9401,7 @@
           <a:lstStyle/>
           <a:p>
             <a:r>
-              <a:rPr lang="fr-FR">
+              <a:rPr lang="fr-FR" dirty="0">
                 <a:ln>
                   <a:solidFill>
                     <a:srgbClr val="000000">
@@ -9399,12 +9419,645 @@
                   </a:outerShdw>
                 </a:effectLst>
               </a:rPr>
-              <a:t>Presentation entreprise</a:t>
-            </a:r>
-            <a:endParaRPr lang="fr-FR"/>
+              <a:t>Présentation de PROXIDEJ</a:t>
+            </a:r>
+            <a:endParaRPr lang="fr-FR" dirty="0"/>
           </a:p>
         </p:txBody>
       </p:sp>
+      <p:pic>
+        <p:nvPicPr>
+          <p:cNvPr id="4" name="Image 3" descr="Une image contenant personne, alimentation, table, femme&#10;&#10;Description générée automatiquement">
+            <a:extLst>
+              <a:ext uri="{FF2B5EF4-FFF2-40B4-BE49-F238E27FC236}">
+                <a16:creationId xmlns:a16="http://schemas.microsoft.com/office/drawing/2014/main" id="{44888B6E-F1E4-4BA8-9844-D4E2848CA456}"/>
+              </a:ext>
+            </a:extLst>
+          </p:cNvPr>
+          <p:cNvPicPr>
+            <a:picLocks noChangeAspect="1"/>
+          </p:cNvPicPr>
+          <p:nvPr/>
+        </p:nvPicPr>
+        <p:blipFill>
+          <a:blip r:embed="rId2">
+            <a:extLst>
+              <a:ext uri="{28A0092B-C50C-407E-A947-70E740481C1C}">
+                <a14:useLocalDpi xmlns:a14="http://schemas.microsoft.com/office/drawing/2010/main" val="0"/>
+              </a:ext>
+            </a:extLst>
+          </a:blip>
+          <a:stretch>
+            <a:fillRect/>
+          </a:stretch>
+        </p:blipFill>
+        <p:spPr>
+          <a:xfrm>
+            <a:off x="696635" y="1785597"/>
+            <a:ext cx="4443752" cy="4021596"/>
+          </a:xfrm>
+          <a:prstGeom prst="rect">
+            <a:avLst/>
+          </a:prstGeom>
+        </p:spPr>
+      </p:pic>
+      <p:sp>
+        <p:nvSpPr>
+          <p:cNvPr id="6" name="Sous-titre 2">
+            <a:extLst>
+              <a:ext uri="{FF2B5EF4-FFF2-40B4-BE49-F238E27FC236}">
+                <a16:creationId xmlns:a16="http://schemas.microsoft.com/office/drawing/2014/main" id="{D70605D8-0A41-4AF5-9E16-4D5E72CBC201}"/>
+              </a:ext>
+            </a:extLst>
+          </p:cNvPr>
+          <p:cNvSpPr txBox="1">
+            <a:spLocks/>
+          </p:cNvSpPr>
+          <p:nvPr/>
+        </p:nvSpPr>
+        <p:spPr>
+          <a:xfrm>
+            <a:off x="5230534" y="1901159"/>
+            <a:ext cx="4210478" cy="3898900"/>
+          </a:xfrm>
+          <a:prstGeom prst="rect">
+            <a:avLst/>
+          </a:prstGeom>
+        </p:spPr>
+        <p:txBody>
+          <a:bodyPr vert="horz" lIns="91440" tIns="45720" rIns="91440" bIns="45720" rtlCol="0">
+            <a:normAutofit/>
+          </a:bodyPr>
+          <a:lstStyle>
+            <a:lvl1pPr marL="91440" indent="-91440" algn="l" defTabSz="914400" rtl="0" eaLnBrk="1" latinLnBrk="0" hangingPunct="1">
+              <a:lnSpc>
+                <a:spcPct val="90000"/>
+              </a:lnSpc>
+              <a:spcBef>
+                <a:spcPts val="1200"/>
+              </a:spcBef>
+              <a:spcAft>
+                <a:spcPts val="200"/>
+              </a:spcAft>
+              <a:buClr>
+                <a:schemeClr val="accent1"/>
+              </a:buClr>
+              <a:buSzPct val="100000"/>
+              <a:buFont typeface="Calibri" panose="020F0502020204030204" pitchFamily="34" charset="0"/>
+              <a:buChar char=" "/>
+              <a:defRPr sz="2000" kern="1200">
+                <a:solidFill>
+                  <a:schemeClr val="tx1">
+                    <a:lumMod val="75000"/>
+                    <a:lumOff val="25000"/>
+                  </a:schemeClr>
+                </a:solidFill>
+                <a:latin typeface="+mn-lt"/>
+                <a:ea typeface="+mn-ea"/>
+                <a:cs typeface="+mn-cs"/>
+              </a:defRPr>
+            </a:lvl1pPr>
+            <a:lvl2pPr marL="384048" indent="-182880" algn="l" defTabSz="914400" rtl="0" eaLnBrk="1" latinLnBrk="0" hangingPunct="1">
+              <a:lnSpc>
+                <a:spcPct val="90000"/>
+              </a:lnSpc>
+              <a:spcBef>
+                <a:spcPts val="200"/>
+              </a:spcBef>
+              <a:spcAft>
+                <a:spcPts val="400"/>
+              </a:spcAft>
+              <a:buClr>
+                <a:schemeClr val="accent1"/>
+              </a:buClr>
+              <a:buFont typeface="Calibri" pitchFamily="34" charset="0"/>
+              <a:buChar char="◦"/>
+              <a:defRPr sz="1800" kern="1200">
+                <a:solidFill>
+                  <a:schemeClr val="tx1">
+                    <a:lumMod val="75000"/>
+                    <a:lumOff val="25000"/>
+                  </a:schemeClr>
+                </a:solidFill>
+                <a:latin typeface="+mn-lt"/>
+                <a:ea typeface="+mn-ea"/>
+                <a:cs typeface="+mn-cs"/>
+              </a:defRPr>
+            </a:lvl2pPr>
+            <a:lvl3pPr marL="566928" indent="-182880" algn="l" defTabSz="914400" rtl="0" eaLnBrk="1" latinLnBrk="0" hangingPunct="1">
+              <a:lnSpc>
+                <a:spcPct val="90000"/>
+              </a:lnSpc>
+              <a:spcBef>
+                <a:spcPts val="200"/>
+              </a:spcBef>
+              <a:spcAft>
+                <a:spcPts val="400"/>
+              </a:spcAft>
+              <a:buClr>
+                <a:schemeClr val="accent1"/>
+              </a:buClr>
+              <a:buFont typeface="Calibri" pitchFamily="34" charset="0"/>
+              <a:buChar char="◦"/>
+              <a:defRPr sz="1400" kern="1200">
+                <a:solidFill>
+                  <a:schemeClr val="tx1">
+                    <a:lumMod val="75000"/>
+                    <a:lumOff val="25000"/>
+                  </a:schemeClr>
+                </a:solidFill>
+                <a:latin typeface="+mn-lt"/>
+                <a:ea typeface="+mn-ea"/>
+                <a:cs typeface="+mn-cs"/>
+              </a:defRPr>
+            </a:lvl3pPr>
+            <a:lvl4pPr marL="749808" indent="-182880" algn="l" defTabSz="914400" rtl="0" eaLnBrk="1" latinLnBrk="0" hangingPunct="1">
+              <a:lnSpc>
+                <a:spcPct val="90000"/>
+              </a:lnSpc>
+              <a:spcBef>
+                <a:spcPts val="200"/>
+              </a:spcBef>
+              <a:spcAft>
+                <a:spcPts val="400"/>
+              </a:spcAft>
+              <a:buClr>
+                <a:schemeClr val="accent1"/>
+              </a:buClr>
+              <a:buFont typeface="Calibri" pitchFamily="34" charset="0"/>
+              <a:buChar char="◦"/>
+              <a:defRPr sz="1400" kern="1200">
+                <a:solidFill>
+                  <a:schemeClr val="tx1">
+                    <a:lumMod val="75000"/>
+                    <a:lumOff val="25000"/>
+                  </a:schemeClr>
+                </a:solidFill>
+                <a:latin typeface="+mn-lt"/>
+                <a:ea typeface="+mn-ea"/>
+                <a:cs typeface="+mn-cs"/>
+              </a:defRPr>
+            </a:lvl4pPr>
+            <a:lvl5pPr marL="932688" indent="-182880" algn="l" defTabSz="914400" rtl="0" eaLnBrk="1" latinLnBrk="0" hangingPunct="1">
+              <a:lnSpc>
+                <a:spcPct val="90000"/>
+              </a:lnSpc>
+              <a:spcBef>
+                <a:spcPts val="200"/>
+              </a:spcBef>
+              <a:spcAft>
+                <a:spcPts val="400"/>
+              </a:spcAft>
+              <a:buClr>
+                <a:schemeClr val="accent1"/>
+              </a:buClr>
+              <a:buFont typeface="Calibri" pitchFamily="34" charset="0"/>
+              <a:buChar char="◦"/>
+              <a:defRPr sz="1400" kern="1200">
+                <a:solidFill>
+                  <a:schemeClr val="tx1">
+                    <a:lumMod val="75000"/>
+                    <a:lumOff val="25000"/>
+                  </a:schemeClr>
+                </a:solidFill>
+                <a:latin typeface="+mn-lt"/>
+                <a:ea typeface="+mn-ea"/>
+                <a:cs typeface="+mn-cs"/>
+              </a:defRPr>
+            </a:lvl5pPr>
+            <a:lvl6pPr marL="1100000" indent="-228600" algn="l" defTabSz="914400" rtl="0" eaLnBrk="1" latinLnBrk="0" hangingPunct="1">
+              <a:lnSpc>
+                <a:spcPct val="90000"/>
+              </a:lnSpc>
+              <a:spcBef>
+                <a:spcPts val="200"/>
+              </a:spcBef>
+              <a:spcAft>
+                <a:spcPts val="400"/>
+              </a:spcAft>
+              <a:buClr>
+                <a:schemeClr val="accent1"/>
+              </a:buClr>
+              <a:buFont typeface="Calibri" pitchFamily="34" charset="0"/>
+              <a:buChar char="◦"/>
+              <a:defRPr sz="1400" kern="1200">
+                <a:solidFill>
+                  <a:schemeClr val="tx1">
+                    <a:lumMod val="75000"/>
+                    <a:lumOff val="25000"/>
+                  </a:schemeClr>
+                </a:solidFill>
+                <a:latin typeface="+mn-lt"/>
+                <a:ea typeface="+mn-ea"/>
+                <a:cs typeface="+mn-cs"/>
+              </a:defRPr>
+            </a:lvl6pPr>
+            <a:lvl7pPr marL="1300000" indent="-228600" algn="l" defTabSz="914400" rtl="0" eaLnBrk="1" latinLnBrk="0" hangingPunct="1">
+              <a:lnSpc>
+                <a:spcPct val="90000"/>
+              </a:lnSpc>
+              <a:spcBef>
+                <a:spcPts val="200"/>
+              </a:spcBef>
+              <a:spcAft>
+                <a:spcPts val="400"/>
+              </a:spcAft>
+              <a:buClr>
+                <a:schemeClr val="accent1"/>
+              </a:buClr>
+              <a:buFont typeface="Calibri" pitchFamily="34" charset="0"/>
+              <a:buChar char="◦"/>
+              <a:defRPr sz="1400" kern="1200">
+                <a:solidFill>
+                  <a:schemeClr val="tx1">
+                    <a:lumMod val="75000"/>
+                    <a:lumOff val="25000"/>
+                  </a:schemeClr>
+                </a:solidFill>
+                <a:latin typeface="+mn-lt"/>
+                <a:ea typeface="+mn-ea"/>
+                <a:cs typeface="+mn-cs"/>
+              </a:defRPr>
+            </a:lvl7pPr>
+            <a:lvl8pPr marL="1500000" indent="-228600" algn="l" defTabSz="914400" rtl="0" eaLnBrk="1" latinLnBrk="0" hangingPunct="1">
+              <a:lnSpc>
+                <a:spcPct val="90000"/>
+              </a:lnSpc>
+              <a:spcBef>
+                <a:spcPts val="200"/>
+              </a:spcBef>
+              <a:spcAft>
+                <a:spcPts val="400"/>
+              </a:spcAft>
+              <a:buClr>
+                <a:schemeClr val="accent1"/>
+              </a:buClr>
+              <a:buFont typeface="Calibri" pitchFamily="34" charset="0"/>
+              <a:buChar char="◦"/>
+              <a:defRPr sz="1400" kern="1200">
+                <a:solidFill>
+                  <a:schemeClr val="tx1">
+                    <a:lumMod val="75000"/>
+                    <a:lumOff val="25000"/>
+                  </a:schemeClr>
+                </a:solidFill>
+                <a:latin typeface="+mn-lt"/>
+                <a:ea typeface="+mn-ea"/>
+                <a:cs typeface="+mn-cs"/>
+              </a:defRPr>
+            </a:lvl8pPr>
+            <a:lvl9pPr marL="1700000" indent="-228600" algn="l" defTabSz="914400" rtl="0" eaLnBrk="1" latinLnBrk="0" hangingPunct="1">
+              <a:lnSpc>
+                <a:spcPct val="90000"/>
+              </a:lnSpc>
+              <a:spcBef>
+                <a:spcPts val="200"/>
+              </a:spcBef>
+              <a:spcAft>
+                <a:spcPts val="400"/>
+              </a:spcAft>
+              <a:buClr>
+                <a:schemeClr val="accent1"/>
+              </a:buClr>
+              <a:buFont typeface="Calibri" pitchFamily="34" charset="0"/>
+              <a:buChar char="◦"/>
+              <a:defRPr sz="1400" kern="1200">
+                <a:solidFill>
+                  <a:schemeClr val="tx1">
+                    <a:lumMod val="75000"/>
+                    <a:lumOff val="25000"/>
+                  </a:schemeClr>
+                </a:solidFill>
+                <a:latin typeface="+mn-lt"/>
+                <a:ea typeface="+mn-ea"/>
+                <a:cs typeface="+mn-cs"/>
+              </a:defRPr>
+            </a:lvl9pPr>
+          </a:lstStyle>
+          <a:p>
+            <a:pPr indent="-228600">
+              <a:buFont typeface="Wingdings 3" charset="2"/>
+              <a:buChar char=""/>
+            </a:pPr>
+            <a:r>
+              <a:rPr lang="en-US" dirty="0" err="1">
+                <a:ln>
+                  <a:solidFill>
+                    <a:srgbClr val="000000">
+                      <a:lumMod val="75000"/>
+                      <a:lumOff val="25000"/>
+                      <a:alpha val="10000"/>
+                    </a:srgbClr>
+                  </a:solidFill>
+                </a:ln>
+                <a:solidFill>
+                  <a:schemeClr val="tx1"/>
+                </a:solidFill>
+              </a:rPr>
+              <a:t>Créer</a:t>
+            </a:r>
+            <a:r>
+              <a:rPr lang="en-US" dirty="0">
+                <a:ln>
+                  <a:solidFill>
+                    <a:srgbClr val="000000">
+                      <a:lumMod val="75000"/>
+                      <a:lumOff val="25000"/>
+                      <a:alpha val="10000"/>
+                    </a:srgbClr>
+                  </a:solidFill>
+                </a:ln>
+                <a:solidFill>
+                  <a:schemeClr val="tx1"/>
+                </a:solidFill>
+              </a:rPr>
+              <a:t> le 24 Avril 2010</a:t>
+            </a:r>
+          </a:p>
+          <a:p>
+            <a:pPr indent="-228600">
+              <a:buFont typeface="Wingdings 3" charset="2"/>
+              <a:buChar char=""/>
+            </a:pPr>
+            <a:r>
+              <a:rPr lang="fr-FR" dirty="0"/>
+              <a:t>3 RUE DU CARRE DE VIGNES 44690 MONNIERES</a:t>
+            </a:r>
+            <a:r>
+              <a:rPr lang="en-US" dirty="0">
+                <a:ln>
+                  <a:solidFill>
+                    <a:srgbClr val="000000">
+                      <a:lumMod val="75000"/>
+                      <a:lumOff val="25000"/>
+                      <a:alpha val="10000"/>
+                    </a:srgbClr>
+                  </a:solidFill>
+                </a:ln>
+                <a:solidFill>
+                  <a:schemeClr val="tx1"/>
+                </a:solidFill>
+              </a:rPr>
+              <a:t> </a:t>
+            </a:r>
+          </a:p>
+          <a:p>
+            <a:pPr indent="-228600">
+              <a:buFont typeface="Wingdings 3" charset="2"/>
+              <a:buChar char=""/>
+            </a:pPr>
+            <a:r>
+              <a:rPr lang="en-US" dirty="0">
+                <a:ln>
+                  <a:solidFill>
+                    <a:srgbClr val="000000">
+                      <a:lumMod val="75000"/>
+                      <a:lumOff val="25000"/>
+                      <a:alpha val="10000"/>
+                    </a:srgbClr>
+                  </a:solidFill>
+                </a:ln>
+                <a:solidFill>
+                  <a:schemeClr val="tx1"/>
+                </a:solidFill>
+              </a:rPr>
+              <a:t>2 </a:t>
+            </a:r>
+            <a:r>
+              <a:rPr lang="en-US" dirty="0" err="1">
+                <a:ln>
+                  <a:solidFill>
+                    <a:srgbClr val="000000">
+                      <a:lumMod val="75000"/>
+                      <a:lumOff val="25000"/>
+                      <a:alpha val="10000"/>
+                    </a:srgbClr>
+                  </a:solidFill>
+                </a:ln>
+                <a:solidFill>
+                  <a:schemeClr val="tx1"/>
+                </a:solidFill>
+              </a:rPr>
+              <a:t>salariés</a:t>
+            </a:r>
+            <a:endParaRPr lang="en-US" dirty="0">
+              <a:ln>
+                <a:solidFill>
+                  <a:srgbClr val="000000">
+                    <a:lumMod val="75000"/>
+                    <a:lumOff val="25000"/>
+                    <a:alpha val="10000"/>
+                  </a:srgbClr>
+                </a:solidFill>
+              </a:ln>
+              <a:solidFill>
+                <a:schemeClr val="tx1"/>
+              </a:solidFill>
+            </a:endParaRPr>
+          </a:p>
+          <a:p>
+            <a:pPr indent="-228600">
+              <a:buFont typeface="Wingdings 3" charset="2"/>
+              <a:buChar char=""/>
+            </a:pPr>
+            <a:r>
+              <a:rPr lang="en-US" dirty="0" err="1">
+                <a:ln>
+                  <a:solidFill>
+                    <a:srgbClr val="000000">
+                      <a:lumMod val="75000"/>
+                      <a:lumOff val="25000"/>
+                      <a:alpha val="10000"/>
+                    </a:srgbClr>
+                  </a:solidFill>
+                </a:ln>
+                <a:solidFill>
+                  <a:schemeClr val="tx1"/>
+                </a:solidFill>
+              </a:rPr>
+              <a:t>Chiffre</a:t>
+            </a:r>
+            <a:r>
+              <a:rPr lang="en-US" dirty="0">
+                <a:ln>
+                  <a:solidFill>
+                    <a:srgbClr val="000000">
+                      <a:lumMod val="75000"/>
+                      <a:lumOff val="25000"/>
+                      <a:alpha val="10000"/>
+                    </a:srgbClr>
+                  </a:solidFill>
+                </a:ln>
+                <a:solidFill>
+                  <a:schemeClr val="tx1"/>
+                </a:solidFill>
+              </a:rPr>
+              <a:t> </a:t>
+            </a:r>
+            <a:r>
+              <a:rPr lang="en-US" dirty="0" err="1">
+                <a:ln>
+                  <a:solidFill>
+                    <a:srgbClr val="000000">
+                      <a:lumMod val="75000"/>
+                      <a:lumOff val="25000"/>
+                      <a:alpha val="10000"/>
+                    </a:srgbClr>
+                  </a:solidFill>
+                </a:ln>
+                <a:solidFill>
+                  <a:schemeClr val="tx1"/>
+                </a:solidFill>
+              </a:rPr>
+              <a:t>d’affaire</a:t>
+            </a:r>
+            <a:r>
+              <a:rPr lang="en-US" dirty="0">
+                <a:ln>
+                  <a:solidFill>
+                    <a:srgbClr val="000000">
+                      <a:lumMod val="75000"/>
+                      <a:lumOff val="25000"/>
+                      <a:alpha val="10000"/>
+                    </a:srgbClr>
+                  </a:solidFill>
+                </a:ln>
+                <a:solidFill>
+                  <a:schemeClr val="tx1"/>
+                </a:solidFill>
+              </a:rPr>
+              <a:t> de 2014 à 2017 :</a:t>
+            </a:r>
+          </a:p>
+          <a:p>
+            <a:pPr marL="0" indent="0">
+              <a:buNone/>
+            </a:pPr>
+            <a:endParaRPr lang="en-US" dirty="0">
+              <a:ln>
+                <a:solidFill>
+                  <a:srgbClr val="000000">
+                    <a:lumMod val="75000"/>
+                    <a:lumOff val="25000"/>
+                    <a:alpha val="10000"/>
+                  </a:srgbClr>
+                </a:solidFill>
+              </a:ln>
+              <a:solidFill>
+                <a:schemeClr val="tx1"/>
+              </a:solidFill>
+            </a:endParaRPr>
+          </a:p>
+          <a:p>
+            <a:endParaRPr lang="en-US" dirty="0">
+              <a:ln>
+                <a:solidFill>
+                  <a:srgbClr val="000000">
+                    <a:lumMod val="75000"/>
+                    <a:lumOff val="25000"/>
+                    <a:alpha val="10000"/>
+                  </a:srgbClr>
+                </a:solidFill>
+              </a:ln>
+              <a:solidFill>
+                <a:schemeClr val="tx1"/>
+              </a:solidFill>
+            </a:endParaRPr>
+          </a:p>
+          <a:p>
+            <a:pPr indent="-228600">
+              <a:buFont typeface="Wingdings 3" charset="2"/>
+              <a:buChar char=""/>
+            </a:pPr>
+            <a:endParaRPr lang="en-US" dirty="0">
+              <a:ln>
+                <a:solidFill>
+                  <a:srgbClr val="000000">
+                    <a:lumMod val="75000"/>
+                    <a:lumOff val="25000"/>
+                    <a:alpha val="10000"/>
+                  </a:srgbClr>
+                </a:solidFill>
+              </a:ln>
+              <a:solidFill>
+                <a:schemeClr val="tx1"/>
+              </a:solidFill>
+            </a:endParaRPr>
+          </a:p>
+        </p:txBody>
+      </p:sp>
+      <p:pic>
+        <p:nvPicPr>
+          <p:cNvPr id="8" name="Image 7" descr="Une image contenant texte, carte&#10;&#10;Description générée automatiquement">
+            <a:extLst>
+              <a:ext uri="{FF2B5EF4-FFF2-40B4-BE49-F238E27FC236}">
+                <a16:creationId xmlns:a16="http://schemas.microsoft.com/office/drawing/2014/main" id="{BA94EB88-3548-4C2F-85E9-24AA84C58048}"/>
+              </a:ext>
+            </a:extLst>
+          </p:cNvPr>
+          <p:cNvPicPr>
+            <a:picLocks noChangeAspect="1"/>
+          </p:cNvPicPr>
+          <p:nvPr/>
+        </p:nvPicPr>
+        <p:blipFill>
+          <a:blip r:embed="rId3">
+            <a:extLst>
+              <a:ext uri="{28A0092B-C50C-407E-A947-70E740481C1C}">
+                <a14:useLocalDpi xmlns:a14="http://schemas.microsoft.com/office/drawing/2010/main" val="0"/>
+              </a:ext>
+            </a:extLst>
+          </a:blip>
+          <a:stretch>
+            <a:fillRect/>
+          </a:stretch>
+        </p:blipFill>
+        <p:spPr>
+          <a:xfrm>
+            <a:off x="9338655" y="1057941"/>
+            <a:ext cx="2557275" cy="2878681"/>
+          </a:xfrm>
+          <a:prstGeom prst="rect">
+            <a:avLst/>
+          </a:prstGeom>
+        </p:spPr>
+      </p:pic>
+      <p:pic>
+        <p:nvPicPr>
+          <p:cNvPr id="10" name="Image 9" descr="Une image contenant capture d’écran&#10;&#10;Description générée automatiquement">
+            <a:extLst>
+              <a:ext uri="{FF2B5EF4-FFF2-40B4-BE49-F238E27FC236}">
+                <a16:creationId xmlns:a16="http://schemas.microsoft.com/office/drawing/2014/main" id="{62AED55C-5C29-4435-9532-AAF8499E945D}"/>
+              </a:ext>
+            </a:extLst>
+          </p:cNvPr>
+          <p:cNvPicPr>
+            <a:picLocks noChangeAspect="1"/>
+          </p:cNvPicPr>
+          <p:nvPr/>
+        </p:nvPicPr>
+        <p:blipFill>
+          <a:blip r:embed="rId4">
+            <a:extLst>
+              <a:ext uri="{28A0092B-C50C-407E-A947-70E740481C1C}">
+                <a14:useLocalDpi xmlns:a14="http://schemas.microsoft.com/office/drawing/2010/main" val="0"/>
+              </a:ext>
+            </a:extLst>
+          </a:blip>
+          <a:stretch>
+            <a:fillRect/>
+          </a:stretch>
+        </p:blipFill>
+        <p:spPr>
+          <a:xfrm>
+            <a:off x="5422748" y="4100421"/>
+            <a:ext cx="5457292" cy="2233002"/>
+          </a:xfrm>
+          <a:prstGeom prst="rect">
+            <a:avLst/>
+          </a:prstGeom>
+        </p:spPr>
+      </p:pic>
     </p:spTree>
     <p:extLst>
       <p:ext uri="{BB962C8B-B14F-4D97-AF65-F5344CB8AC3E}">
@@ -9421,6 +10074,14 @@
 <file path=ppt/slides/slide7.xml><?xml version="1.0" encoding="utf-8"?>
 <p:sld xmlns:a="http://schemas.openxmlformats.org/drawingml/2006/main" xmlns:r="http://schemas.openxmlformats.org/officeDocument/2006/relationships" xmlns:p="http://schemas.openxmlformats.org/presentationml/2006/main">
   <p:cSld>
+    <p:bg>
+      <p:bgPr>
+        <a:solidFill>
+          <a:schemeClr val="bg1"/>
+        </a:solidFill>
+        <a:effectLst/>
+      </p:bgPr>
+    </p:bg>
     <p:spTree>
       <p:nvGrpSpPr>
         <p:cNvPr id="1" name=""/>
@@ -9437,6 +10098,231 @@
       </p:grpSpPr>
       <p:sp>
         <p:nvSpPr>
+          <p:cNvPr id="7" name="Rectangle 6">
+            <a:extLst>
+              <a:ext uri="{FF2B5EF4-FFF2-40B4-BE49-F238E27FC236}">
+                <a16:creationId xmlns:a16="http://schemas.microsoft.com/office/drawing/2014/main" id="{52C0B2E1-0268-42EC-ABD3-94F81A05BCBD}"/>
+              </a:ext>
+              <a:ext uri="{C183D7F6-B498-43B3-948B-1728B52AA6E4}">
+                <adec:decorative xmlns:adec="http://schemas.microsoft.com/office/drawing/2017/decorative" val="1"/>
+              </a:ext>
+            </a:extLst>
+          </p:cNvPr>
+          <p:cNvSpPr>
+            <a:spLocks noGrp="1" noRot="1" noChangeAspect="1" noMove="1" noResize="1" noEditPoints="1" noAdjustHandles="1" noChangeArrowheads="1" noChangeShapeType="1" noTextEdit="1"/>
+          </p:cNvSpPr>
+          <p:nvPr>
+            <p:extLst>
+              <p:ext uri="{386F3935-93C4-4BCD-93E2-E3B085C9AB24}">
+                <p16:designElem xmlns:p16="http://schemas.microsoft.com/office/powerpoint/2015/main" val="1"/>
+              </p:ext>
+            </p:extLst>
+          </p:nvPr>
+        </p:nvSpPr>
+        <p:spPr>
+          <a:xfrm>
+            <a:off x="3175" y="6400800"/>
+            <a:ext cx="12188825" cy="457200"/>
+          </a:xfrm>
+          <a:prstGeom prst="rect">
+            <a:avLst/>
+          </a:prstGeom>
+          <a:solidFill>
+            <a:schemeClr val="accent2"/>
+          </a:solidFill>
+          <a:ln>
+            <a:noFill/>
+          </a:ln>
+        </p:spPr>
+        <p:style>
+          <a:lnRef idx="2">
+            <a:schemeClr val="accent1">
+              <a:shade val="50000"/>
+            </a:schemeClr>
+          </a:lnRef>
+          <a:fillRef idx="1">
+            <a:schemeClr val="accent1"/>
+          </a:fillRef>
+          <a:effectRef idx="0">
+            <a:schemeClr val="accent1"/>
+          </a:effectRef>
+          <a:fontRef idx="minor">
+            <a:schemeClr val="lt1"/>
+          </a:fontRef>
+        </p:style>
+      </p:sp>
+      <p:sp>
+        <p:nvSpPr>
+          <p:cNvPr id="9" name="Rectangle 8">
+            <a:extLst>
+              <a:ext uri="{FF2B5EF4-FFF2-40B4-BE49-F238E27FC236}">
+                <a16:creationId xmlns:a16="http://schemas.microsoft.com/office/drawing/2014/main" id="{7D2256B4-48EA-40FC-BBC0-AA1EE6E0080C}"/>
+              </a:ext>
+              <a:ext uri="{C183D7F6-B498-43B3-948B-1728B52AA6E4}">
+                <adec:decorative xmlns:adec="http://schemas.microsoft.com/office/drawing/2017/decorative" val="1"/>
+              </a:ext>
+            </a:extLst>
+          </p:cNvPr>
+          <p:cNvSpPr>
+            <a:spLocks noGrp="1" noRot="1" noChangeAspect="1" noMove="1" noResize="1" noEditPoints="1" noAdjustHandles="1" noChangeArrowheads="1" noChangeShapeType="1" noTextEdit="1"/>
+          </p:cNvSpPr>
+          <p:nvPr>
+            <p:extLst>
+              <p:ext uri="{386F3935-93C4-4BCD-93E2-E3B085C9AB24}">
+                <p16:designElem xmlns:p16="http://schemas.microsoft.com/office/powerpoint/2015/main" val="1"/>
+              </p:ext>
+            </p:extLst>
+          </p:nvPr>
+        </p:nvSpPr>
+        <p:spPr>
+          <a:xfrm>
+            <a:off x="15" y="6334316"/>
+            <a:ext cx="12188825" cy="64008"/>
+          </a:xfrm>
+          <a:prstGeom prst="rect">
+            <a:avLst/>
+          </a:prstGeom>
+          <a:solidFill>
+            <a:schemeClr val="accent1"/>
+          </a:solidFill>
+          <a:ln>
+            <a:noFill/>
+          </a:ln>
+        </p:spPr>
+        <p:style>
+          <a:lnRef idx="2">
+            <a:schemeClr val="accent1">
+              <a:shade val="50000"/>
+            </a:schemeClr>
+          </a:lnRef>
+          <a:fillRef idx="1">
+            <a:schemeClr val="accent1"/>
+          </a:fillRef>
+          <a:effectRef idx="0">
+            <a:schemeClr val="accent1"/>
+          </a:effectRef>
+          <a:fontRef idx="minor">
+            <a:schemeClr val="lt1"/>
+          </a:fontRef>
+        </p:style>
+      </p:sp>
+      <p:cxnSp>
+        <p:nvCxnSpPr>
+          <p:cNvPr id="11" name="Straight Connector 10">
+            <a:extLst>
+              <a:ext uri="{FF2B5EF4-FFF2-40B4-BE49-F238E27FC236}">
+                <a16:creationId xmlns:a16="http://schemas.microsoft.com/office/drawing/2014/main" id="{3D44BCCA-102D-4A9D-B1E4-2450CAF0B05E}"/>
+              </a:ext>
+              <a:ext uri="{C183D7F6-B498-43B3-948B-1728B52AA6E4}">
+                <adec:decorative xmlns:adec="http://schemas.microsoft.com/office/drawing/2017/decorative" val="1"/>
+              </a:ext>
+            </a:extLst>
+          </p:cNvPr>
+          <p:cNvCxnSpPr>
+            <a:cxnSpLocks noGrp="1" noRot="1" noChangeAspect="1" noMove="1" noResize="1" noEditPoints="1" noAdjustHandles="1" noChangeArrowheads="1" noChangeShapeType="1"/>
+          </p:cNvCxnSpPr>
+          <p:nvPr>
+            <p:extLst>
+              <p:ext uri="{386F3935-93C4-4BCD-93E2-E3B085C9AB24}">
+                <p16:designElem xmlns:p16="http://schemas.microsoft.com/office/powerpoint/2015/main" val="1"/>
+              </p:ext>
+            </p:extLst>
+          </p:nvPr>
+        </p:nvCxnSpPr>
+        <p:spPr>
+          <a:xfrm>
+            <a:off x="1207658" y="4343400"/>
+            <a:ext cx="9875520" cy="0"/>
+          </a:xfrm>
+          <a:prstGeom prst="line">
+            <a:avLst/>
+          </a:prstGeom>
+          <a:ln w="6350">
+            <a:solidFill>
+              <a:schemeClr val="tx1">
+                <a:lumMod val="50000"/>
+                <a:lumOff val="50000"/>
+              </a:schemeClr>
+            </a:solidFill>
+          </a:ln>
+        </p:spPr>
+        <p:style>
+          <a:lnRef idx="1">
+            <a:schemeClr val="accent1"/>
+          </a:lnRef>
+          <a:fillRef idx="0">
+            <a:schemeClr val="accent1"/>
+          </a:fillRef>
+          <a:effectRef idx="0">
+            <a:schemeClr val="accent1"/>
+          </a:effectRef>
+          <a:fontRef idx="minor">
+            <a:schemeClr val="tx1"/>
+          </a:fontRef>
+        </p:style>
+      </p:cxnSp>
+      <p:sp useBgFill="1">
+        <p:nvSpPr>
+          <p:cNvPr id="13" name="Rectangle 12">
+            <a:extLst>
+              <a:ext uri="{FF2B5EF4-FFF2-40B4-BE49-F238E27FC236}">
+                <a16:creationId xmlns:a16="http://schemas.microsoft.com/office/drawing/2014/main" id="{8C6E698C-8155-4B8B-BDC9-B7299772B509}"/>
+              </a:ext>
+              <a:ext uri="{C183D7F6-B498-43B3-948B-1728B52AA6E4}">
+                <adec:decorative xmlns:adec="http://schemas.microsoft.com/office/drawing/2017/decorative" val="1"/>
+              </a:ext>
+            </a:extLst>
+          </p:cNvPr>
+          <p:cNvSpPr>
+            <a:spLocks noGrp="1" noRot="1" noChangeAspect="1" noMove="1" noResize="1" noEditPoints="1" noAdjustHandles="1" noChangeArrowheads="1" noChangeShapeType="1" noTextEdit="1"/>
+          </p:cNvSpPr>
+          <p:nvPr>
+            <p:extLst>
+              <p:ext uri="{386F3935-93C4-4BCD-93E2-E3B085C9AB24}">
+                <p16:designElem xmlns:p16="http://schemas.microsoft.com/office/powerpoint/2015/main" val="1"/>
+              </p:ext>
+            </p:extLst>
+          </p:nvPr>
+        </p:nvSpPr>
+        <p:spPr>
+          <a:xfrm>
+            <a:off x="0" y="0"/>
+            <a:ext cx="12188952" cy="6858000"/>
+          </a:xfrm>
+          <a:prstGeom prst="rect">
+            <a:avLst/>
+          </a:prstGeom>
+          <a:ln>
+            <a:noFill/>
+          </a:ln>
+        </p:spPr>
+        <p:style>
+          <a:lnRef idx="2">
+            <a:schemeClr val="accent1">
+              <a:shade val="50000"/>
+            </a:schemeClr>
+          </a:lnRef>
+          <a:fillRef idx="1">
+            <a:schemeClr val="accent1"/>
+          </a:fillRef>
+          <a:effectRef idx="0">
+            <a:schemeClr val="accent1"/>
+          </a:effectRef>
+          <a:fontRef idx="minor">
+            <a:schemeClr val="lt1"/>
+          </a:fontRef>
+        </p:style>
+        <p:txBody>
+          <a:bodyPr rtlCol="0" anchor="ctr"/>
+          <a:lstStyle/>
+          <a:p>
+            <a:pPr algn="ctr"/>
+            <a:endParaRPr lang="en-US"/>
+          </a:p>
+        </p:txBody>
+      </p:sp>
+      <p:sp>
+        <p:nvSpPr>
           <p:cNvPr id="2" name="Titre 1">
             <a:extLst>
               <a:ext uri="{FF2B5EF4-FFF2-40B4-BE49-F238E27FC236}">
@@ -9451,13 +10337,21 @@
             <p:ph type="title"/>
           </p:nvPr>
         </p:nvSpPr>
-        <p:spPr/>
+        <p:spPr>
+          <a:xfrm>
+            <a:off x="965201" y="643467"/>
+            <a:ext cx="6255026" cy="5054008"/>
+          </a:xfrm>
+        </p:spPr>
         <p:txBody>
-          <a:bodyPr/>
+          <a:bodyPr vert="horz" lIns="91440" tIns="45720" rIns="91440" bIns="45720" rtlCol="0" anchor="ctr">
+            <a:normAutofit/>
+          </a:bodyPr>
           <a:lstStyle/>
           <a:p>
-            <a:r>
-              <a:rPr lang="fr-FR">
+            <a:pPr algn="r"/>
+            <a:r>
+              <a:rPr lang="en-US" sz="8000">
                 <a:ln>
                   <a:solidFill>
                     <a:srgbClr val="000000">
@@ -9467,6 +10361,12 @@
                     </a:srgbClr>
                   </a:solidFill>
                 </a:ln>
+                <a:solidFill>
+                  <a:schemeClr val="tx1">
+                    <a:lumMod val="85000"/>
+                    <a:lumOff val="15000"/>
+                  </a:schemeClr>
+                </a:solidFill>
                 <a:effectLst>
                   <a:outerShdw blurRad="9525" dist="25400" dir="14640000" algn="tl" rotWithShape="0">
                     <a:srgbClr val="000000">
@@ -9477,9 +10377,178 @@
               </a:rPr>
               <a:t>Presentation projet</a:t>
             </a:r>
-            <a:endParaRPr lang="fr-FR"/>
+            <a:endParaRPr lang="en-US" sz="8000">
+              <a:solidFill>
+                <a:schemeClr val="tx1">
+                  <a:lumMod val="85000"/>
+                  <a:lumOff val="15000"/>
+                </a:schemeClr>
+              </a:solidFill>
+            </a:endParaRPr>
           </a:p>
         </p:txBody>
+      </p:sp>
+      <p:cxnSp>
+        <p:nvCxnSpPr>
+          <p:cNvPr id="15" name="Straight Connector 14">
+            <a:extLst>
+              <a:ext uri="{FF2B5EF4-FFF2-40B4-BE49-F238E27FC236}">
+                <a16:creationId xmlns:a16="http://schemas.microsoft.com/office/drawing/2014/main" id="{09525C9A-1972-4836-BA7A-706C946EF4DA}"/>
+              </a:ext>
+              <a:ext uri="{C183D7F6-B498-43B3-948B-1728B52AA6E4}">
+                <adec:decorative xmlns:adec="http://schemas.microsoft.com/office/drawing/2017/decorative" val="1"/>
+              </a:ext>
+            </a:extLst>
+          </p:cNvPr>
+          <p:cNvCxnSpPr>
+            <a:cxnSpLocks noGrp="1" noRot="1" noChangeAspect="1" noMove="1" noResize="1" noEditPoints="1" noAdjustHandles="1" noChangeArrowheads="1" noChangeShapeType="1"/>
+          </p:cNvCxnSpPr>
+          <p:nvPr>
+            <p:extLst>
+              <p:ext uri="{386F3935-93C4-4BCD-93E2-E3B085C9AB24}">
+                <p16:designElem xmlns:p16="http://schemas.microsoft.com/office/powerpoint/2015/main" val="1"/>
+              </p:ext>
+            </p:extLst>
+          </p:nvPr>
+        </p:nvCxnSpPr>
+        <p:spPr>
+          <a:xfrm>
+            <a:off x="7534656" y="1391367"/>
+            <a:ext cx="0" cy="3558208"/>
+          </a:xfrm>
+          <a:prstGeom prst="line">
+            <a:avLst/>
+          </a:prstGeom>
+          <a:ln>
+            <a:solidFill>
+              <a:schemeClr val="tx2"/>
+            </a:solidFill>
+          </a:ln>
+        </p:spPr>
+        <p:style>
+          <a:lnRef idx="1">
+            <a:schemeClr val="accent1"/>
+          </a:lnRef>
+          <a:fillRef idx="0">
+            <a:schemeClr val="accent1"/>
+          </a:fillRef>
+          <a:effectRef idx="0">
+            <a:schemeClr val="accent1"/>
+          </a:effectRef>
+          <a:fontRef idx="minor">
+            <a:schemeClr val="tx1"/>
+          </a:fontRef>
+        </p:style>
+      </p:cxnSp>
+      <p:sp>
+        <p:nvSpPr>
+          <p:cNvPr id="17" name="Rectangle 16">
+            <a:extLst>
+              <a:ext uri="{FF2B5EF4-FFF2-40B4-BE49-F238E27FC236}">
+                <a16:creationId xmlns:a16="http://schemas.microsoft.com/office/drawing/2014/main" id="{8A549DE7-671D-4575-AF43-858FD99981CF}"/>
+              </a:ext>
+              <a:ext uri="{C183D7F6-B498-43B3-948B-1728B52AA6E4}">
+                <adec:decorative xmlns:adec="http://schemas.microsoft.com/office/drawing/2017/decorative" val="1"/>
+              </a:ext>
+            </a:extLst>
+          </p:cNvPr>
+          <p:cNvSpPr>
+            <a:spLocks noGrp="1" noRot="1" noChangeAspect="1" noMove="1" noResize="1" noEditPoints="1" noAdjustHandles="1" noChangeArrowheads="1" noChangeShapeType="1" noTextEdit="1"/>
+          </p:cNvSpPr>
+          <p:nvPr>
+            <p:extLst>
+              <p:ext uri="{386F3935-93C4-4BCD-93E2-E3B085C9AB24}">
+                <p16:designElem xmlns:p16="http://schemas.microsoft.com/office/powerpoint/2015/main" val="1"/>
+              </p:ext>
+            </p:extLst>
+          </p:nvPr>
+        </p:nvSpPr>
+        <p:spPr>
+          <a:xfrm>
+            <a:off x="3175" y="6400800"/>
+            <a:ext cx="12188825" cy="457200"/>
+          </a:xfrm>
+          <a:prstGeom prst="rect">
+            <a:avLst/>
+          </a:prstGeom>
+          <a:solidFill>
+            <a:schemeClr val="accent2"/>
+          </a:solidFill>
+          <a:ln>
+            <a:noFill/>
+          </a:ln>
+        </p:spPr>
+        <p:style>
+          <a:lnRef idx="2">
+            <a:schemeClr val="accent1">
+              <a:shade val="50000"/>
+            </a:schemeClr>
+          </a:lnRef>
+          <a:fillRef idx="1">
+            <a:schemeClr val="accent1"/>
+          </a:fillRef>
+          <a:effectRef idx="0">
+            <a:schemeClr val="accent1"/>
+          </a:effectRef>
+          <a:fontRef idx="minor">
+            <a:schemeClr val="lt1"/>
+          </a:fontRef>
+        </p:style>
+      </p:sp>
+      <p:sp>
+        <p:nvSpPr>
+          <p:cNvPr id="19" name="Rectangle 18">
+            <a:extLst>
+              <a:ext uri="{FF2B5EF4-FFF2-40B4-BE49-F238E27FC236}">
+                <a16:creationId xmlns:a16="http://schemas.microsoft.com/office/drawing/2014/main" id="{C22D9B36-9BE7-472B-8808-7E0D6810738F}"/>
+              </a:ext>
+              <a:ext uri="{C183D7F6-B498-43B3-948B-1728B52AA6E4}">
+                <adec:decorative xmlns:adec="http://schemas.microsoft.com/office/drawing/2017/decorative" val="1"/>
+              </a:ext>
+            </a:extLst>
+          </p:cNvPr>
+          <p:cNvSpPr>
+            <a:spLocks noGrp="1" noRot="1" noChangeAspect="1" noMove="1" noResize="1" noEditPoints="1" noAdjustHandles="1" noChangeArrowheads="1" noChangeShapeType="1" noTextEdit="1"/>
+          </p:cNvSpPr>
+          <p:nvPr>
+            <p:extLst>
+              <p:ext uri="{386F3935-93C4-4BCD-93E2-E3B085C9AB24}">
+                <p16:designElem xmlns:p16="http://schemas.microsoft.com/office/powerpoint/2015/main" val="1"/>
+              </p:ext>
+            </p:extLst>
+          </p:nvPr>
+        </p:nvSpPr>
+        <p:spPr>
+          <a:xfrm>
+            <a:off x="15" y="6340942"/>
+            <a:ext cx="12188825" cy="64008"/>
+          </a:xfrm>
+          <a:prstGeom prst="rect">
+            <a:avLst/>
+          </a:prstGeom>
+          <a:solidFill>
+            <a:schemeClr val="accent1"/>
+          </a:solidFill>
+          <a:ln>
+            <a:noFill/>
+          </a:ln>
+        </p:spPr>
+        <p:style>
+          <a:lnRef idx="2">
+            <a:schemeClr val="accent1">
+              <a:shade val="50000"/>
+            </a:schemeClr>
+          </a:lnRef>
+          <a:fillRef idx="1">
+            <a:schemeClr val="accent1"/>
+          </a:fillRef>
+          <a:effectRef idx="0">
+            <a:schemeClr val="accent1"/>
+          </a:effectRef>
+          <a:fontRef idx="minor">
+            <a:schemeClr val="lt1"/>
+          </a:fontRef>
+        </p:style>
       </p:sp>
     </p:spTree>
     <p:extLst>

</xml_diff>

<commit_message>
Ajout de chemin de fer dans le diapo
</commit_message>
<xml_diff>
--- a/Diaporama/DIAPO_01.pptx
+++ b/Diaporama/DIAPO_01.pptx
@@ -12,6 +12,8 @@
     <p:sldId id="262" r:id="rId6"/>
     <p:sldId id="259" r:id="rId7"/>
     <p:sldId id="260" r:id="rId8"/>
+    <p:sldId id="263" r:id="rId9"/>
+    <p:sldId id="264" r:id="rId10"/>
   </p:sldIdLst>
   <p:sldSz cx="12192000" cy="6858000"/>
   <p:notesSz cx="6858000" cy="9144000"/>
@@ -8068,6 +8070,231 @@
           </p:spPr>
         </p:pic>
       </p:grpSp>
+      <p:pic>
+        <p:nvPicPr>
+          <p:cNvPr id="9" name="Espace réservé du contenu 4">
+            <a:extLst>
+              <a:ext uri="{FF2B5EF4-FFF2-40B4-BE49-F238E27FC236}">
+                <a16:creationId xmlns:a16="http://schemas.microsoft.com/office/drawing/2014/main" id="{84718EC6-12A5-42D7-988F-0587E0EB27BD}"/>
+              </a:ext>
+            </a:extLst>
+          </p:cNvPr>
+          <p:cNvPicPr>
+            <a:picLocks noGrp="1" noChangeAspect="1"/>
+          </p:cNvPicPr>
+          <p:nvPr>
+            <p:ph idx="1"/>
+          </p:nvPr>
+        </p:nvPicPr>
+        <p:blipFill>
+          <a:blip r:embed="rId4" cstate="print">
+            <a:extLst>
+              <a:ext uri="{28A0092B-C50C-407E-A947-70E740481C1C}">
+                <a14:useLocalDpi xmlns:a14="http://schemas.microsoft.com/office/drawing/2010/main" val="0"/>
+              </a:ext>
+            </a:extLst>
+          </a:blip>
+          <a:stretch>
+            <a:fillRect/>
+          </a:stretch>
+        </p:blipFill>
+        <p:spPr>
+          <a:xfrm>
+            <a:off x="1077076" y="6318665"/>
+            <a:ext cx="616018" cy="616018"/>
+          </a:xfrm>
+        </p:spPr>
+      </p:pic>
+      <p:sp>
+        <p:nvSpPr>
+          <p:cNvPr id="14" name="ZoneTexte 13">
+            <a:extLst>
+              <a:ext uri="{FF2B5EF4-FFF2-40B4-BE49-F238E27FC236}">
+                <a16:creationId xmlns:a16="http://schemas.microsoft.com/office/drawing/2014/main" id="{471E22CC-3A2A-4E27-B85D-E19F0C950E03}"/>
+              </a:ext>
+            </a:extLst>
+          </p:cNvPr>
+          <p:cNvSpPr txBox="1"/>
+          <p:nvPr/>
+        </p:nvSpPr>
+        <p:spPr>
+          <a:xfrm>
+            <a:off x="1693094" y="6442008"/>
+            <a:ext cx="1068371" cy="369332"/>
+          </a:xfrm>
+          <a:prstGeom prst="rect">
+            <a:avLst/>
+          </a:prstGeom>
+          <a:noFill/>
+        </p:spPr>
+        <p:txBody>
+          <a:bodyPr wrap="square" rtlCol="0">
+            <a:spAutoFit/>
+          </a:bodyPr>
+          <a:lstStyle/>
+          <a:p>
+            <a:pPr algn="just"/>
+            <a:r>
+              <a:rPr lang="fr-FR" dirty="0">
+                <a:latin typeface="Agency FB" panose="020B0503020202020204" pitchFamily="34" charset="0"/>
+              </a:rPr>
+              <a:t>Introduction</a:t>
+            </a:r>
+          </a:p>
+        </p:txBody>
+      </p:sp>
+      <p:sp>
+        <p:nvSpPr>
+          <p:cNvPr id="15" name="ZoneTexte 14">
+            <a:extLst>
+              <a:ext uri="{FF2B5EF4-FFF2-40B4-BE49-F238E27FC236}">
+                <a16:creationId xmlns:a16="http://schemas.microsoft.com/office/drawing/2014/main" id="{153FC371-398A-43C4-8B2B-0504F565CAFC}"/>
+              </a:ext>
+            </a:extLst>
+          </p:cNvPr>
+          <p:cNvSpPr txBox="1"/>
+          <p:nvPr/>
+        </p:nvSpPr>
+        <p:spPr>
+          <a:xfrm>
+            <a:off x="3409929" y="6442008"/>
+            <a:ext cx="2107025" cy="369332"/>
+          </a:xfrm>
+          <a:prstGeom prst="rect">
+            <a:avLst/>
+          </a:prstGeom>
+          <a:noFill/>
+        </p:spPr>
+        <p:txBody>
+          <a:bodyPr wrap="square" rtlCol="0">
+            <a:spAutoFit/>
+          </a:bodyPr>
+          <a:lstStyle/>
+          <a:p>
+            <a:pPr algn="just"/>
+            <a:r>
+              <a:rPr lang="fr-FR" dirty="0">
+                <a:latin typeface="Agency FB" panose="020B0503020202020204" pitchFamily="34" charset="0"/>
+              </a:rPr>
+              <a:t>Présentation de PROXIDEJ</a:t>
+            </a:r>
+          </a:p>
+        </p:txBody>
+      </p:sp>
+      <p:sp>
+        <p:nvSpPr>
+          <p:cNvPr id="16" name="ZoneTexte 15">
+            <a:extLst>
+              <a:ext uri="{FF2B5EF4-FFF2-40B4-BE49-F238E27FC236}">
+                <a16:creationId xmlns:a16="http://schemas.microsoft.com/office/drawing/2014/main" id="{77EB3CCB-14F0-480E-A8A3-6962C02FD1E8}"/>
+              </a:ext>
+            </a:extLst>
+          </p:cNvPr>
+          <p:cNvSpPr txBox="1"/>
+          <p:nvPr/>
+        </p:nvSpPr>
+        <p:spPr>
+          <a:xfrm>
+            <a:off x="6089564" y="6442008"/>
+            <a:ext cx="1409469" cy="369332"/>
+          </a:xfrm>
+          <a:prstGeom prst="rect">
+            <a:avLst/>
+          </a:prstGeom>
+          <a:noFill/>
+        </p:spPr>
+        <p:txBody>
+          <a:bodyPr wrap="square" rtlCol="0">
+            <a:spAutoFit/>
+          </a:bodyPr>
+          <a:lstStyle/>
+          <a:p>
+            <a:pPr algn="just"/>
+            <a:r>
+              <a:rPr lang="fr-FR" dirty="0">
+                <a:latin typeface="Agency FB" panose="020B0503020202020204" pitchFamily="34" charset="0"/>
+              </a:rPr>
+              <a:t>Projet en groupe</a:t>
+            </a:r>
+          </a:p>
+        </p:txBody>
+      </p:sp>
+      <p:sp>
+        <p:nvSpPr>
+          <p:cNvPr id="17" name="ZoneTexte 16">
+            <a:extLst>
+              <a:ext uri="{FF2B5EF4-FFF2-40B4-BE49-F238E27FC236}">
+                <a16:creationId xmlns:a16="http://schemas.microsoft.com/office/drawing/2014/main" id="{D1F563A7-E0DC-46D4-97A3-E985313D3029}"/>
+              </a:ext>
+            </a:extLst>
+          </p:cNvPr>
+          <p:cNvSpPr txBox="1"/>
+          <p:nvPr/>
+        </p:nvSpPr>
+        <p:spPr>
+          <a:xfrm>
+            <a:off x="8071644" y="6442008"/>
+            <a:ext cx="1409468" cy="369332"/>
+          </a:xfrm>
+          <a:prstGeom prst="rect">
+            <a:avLst/>
+          </a:prstGeom>
+          <a:noFill/>
+        </p:spPr>
+        <p:txBody>
+          <a:bodyPr wrap="square" rtlCol="0">
+            <a:spAutoFit/>
+          </a:bodyPr>
+          <a:lstStyle/>
+          <a:p>
+            <a:pPr algn="just"/>
+            <a:r>
+              <a:rPr lang="fr-FR" dirty="0">
+                <a:latin typeface="Agency FB" panose="020B0503020202020204" pitchFamily="34" charset="0"/>
+              </a:rPr>
+              <a:t>Projet personnel</a:t>
+            </a:r>
+          </a:p>
+        </p:txBody>
+      </p:sp>
+      <p:sp>
+        <p:nvSpPr>
+          <p:cNvPr id="18" name="ZoneTexte 17">
+            <a:extLst>
+              <a:ext uri="{FF2B5EF4-FFF2-40B4-BE49-F238E27FC236}">
+                <a16:creationId xmlns:a16="http://schemas.microsoft.com/office/drawing/2014/main" id="{0377237B-37B0-4113-A8D5-CC141D5F81D3}"/>
+              </a:ext>
+            </a:extLst>
+          </p:cNvPr>
+          <p:cNvSpPr txBox="1"/>
+          <p:nvPr/>
+        </p:nvSpPr>
+        <p:spPr>
+          <a:xfrm>
+            <a:off x="10053722" y="6442008"/>
+            <a:ext cx="1040998" cy="369332"/>
+          </a:xfrm>
+          <a:prstGeom prst="rect">
+            <a:avLst/>
+          </a:prstGeom>
+          <a:noFill/>
+        </p:spPr>
+        <p:txBody>
+          <a:bodyPr wrap="square" rtlCol="0">
+            <a:spAutoFit/>
+          </a:bodyPr>
+          <a:lstStyle/>
+          <a:p>
+            <a:pPr algn="just"/>
+            <a:r>
+              <a:rPr lang="fr-FR" dirty="0">
+                <a:latin typeface="Agency FB" panose="020B0503020202020204" pitchFamily="34" charset="0"/>
+              </a:rPr>
+              <a:t>Conclusion</a:t>
+            </a:r>
+          </a:p>
+        </p:txBody>
+      </p:sp>
     </p:spTree>
     <p:extLst>
       <p:ext uri="{BB962C8B-B14F-4D97-AF65-F5344CB8AC3E}">
@@ -8458,6 +8685,231 @@
           </p:spPr>
         </p:pic>
       </p:grpSp>
+      <p:pic>
+        <p:nvPicPr>
+          <p:cNvPr id="9" name="Espace réservé du contenu 4">
+            <a:extLst>
+              <a:ext uri="{FF2B5EF4-FFF2-40B4-BE49-F238E27FC236}">
+                <a16:creationId xmlns:a16="http://schemas.microsoft.com/office/drawing/2014/main" id="{265D5BD5-909E-4B41-BCD2-9C53423C99B9}"/>
+              </a:ext>
+            </a:extLst>
+          </p:cNvPr>
+          <p:cNvPicPr>
+            <a:picLocks noGrp="1" noChangeAspect="1"/>
+          </p:cNvPicPr>
+          <p:nvPr>
+            <p:ph idx="1"/>
+          </p:nvPr>
+        </p:nvPicPr>
+        <p:blipFill>
+          <a:blip r:embed="rId5" cstate="print">
+            <a:extLst>
+              <a:ext uri="{28A0092B-C50C-407E-A947-70E740481C1C}">
+                <a14:useLocalDpi xmlns:a14="http://schemas.microsoft.com/office/drawing/2010/main" val="0"/>
+              </a:ext>
+            </a:extLst>
+          </a:blip>
+          <a:stretch>
+            <a:fillRect/>
+          </a:stretch>
+        </p:blipFill>
+        <p:spPr>
+          <a:xfrm>
+            <a:off x="1077076" y="6318665"/>
+            <a:ext cx="616018" cy="616018"/>
+          </a:xfrm>
+        </p:spPr>
+      </p:pic>
+      <p:sp>
+        <p:nvSpPr>
+          <p:cNvPr id="15" name="ZoneTexte 14">
+            <a:extLst>
+              <a:ext uri="{FF2B5EF4-FFF2-40B4-BE49-F238E27FC236}">
+                <a16:creationId xmlns:a16="http://schemas.microsoft.com/office/drawing/2014/main" id="{8A5CB48D-E055-48EA-9A03-1B8D7236212F}"/>
+              </a:ext>
+            </a:extLst>
+          </p:cNvPr>
+          <p:cNvSpPr txBox="1"/>
+          <p:nvPr/>
+        </p:nvSpPr>
+        <p:spPr>
+          <a:xfrm>
+            <a:off x="1693094" y="6442008"/>
+            <a:ext cx="1068371" cy="369332"/>
+          </a:xfrm>
+          <a:prstGeom prst="rect">
+            <a:avLst/>
+          </a:prstGeom>
+          <a:noFill/>
+        </p:spPr>
+        <p:txBody>
+          <a:bodyPr wrap="square" rtlCol="0">
+            <a:spAutoFit/>
+          </a:bodyPr>
+          <a:lstStyle/>
+          <a:p>
+            <a:pPr algn="just"/>
+            <a:r>
+              <a:rPr lang="fr-FR" dirty="0">
+                <a:latin typeface="Agency FB" panose="020B0503020202020204" pitchFamily="34" charset="0"/>
+              </a:rPr>
+              <a:t>Introduction</a:t>
+            </a:r>
+          </a:p>
+        </p:txBody>
+      </p:sp>
+      <p:sp>
+        <p:nvSpPr>
+          <p:cNvPr id="16" name="ZoneTexte 15">
+            <a:extLst>
+              <a:ext uri="{FF2B5EF4-FFF2-40B4-BE49-F238E27FC236}">
+                <a16:creationId xmlns:a16="http://schemas.microsoft.com/office/drawing/2014/main" id="{66081493-C009-4CBE-980A-97A52AB3D575}"/>
+              </a:ext>
+            </a:extLst>
+          </p:cNvPr>
+          <p:cNvSpPr txBox="1"/>
+          <p:nvPr/>
+        </p:nvSpPr>
+        <p:spPr>
+          <a:xfrm>
+            <a:off x="3409929" y="6442008"/>
+            <a:ext cx="2107025" cy="369332"/>
+          </a:xfrm>
+          <a:prstGeom prst="rect">
+            <a:avLst/>
+          </a:prstGeom>
+          <a:noFill/>
+        </p:spPr>
+        <p:txBody>
+          <a:bodyPr wrap="square" rtlCol="0">
+            <a:spAutoFit/>
+          </a:bodyPr>
+          <a:lstStyle/>
+          <a:p>
+            <a:pPr algn="just"/>
+            <a:r>
+              <a:rPr lang="fr-FR" dirty="0">
+                <a:latin typeface="Agency FB" panose="020B0503020202020204" pitchFamily="34" charset="0"/>
+              </a:rPr>
+              <a:t>Présentation de PROXIDEJ</a:t>
+            </a:r>
+          </a:p>
+        </p:txBody>
+      </p:sp>
+      <p:sp>
+        <p:nvSpPr>
+          <p:cNvPr id="17" name="ZoneTexte 16">
+            <a:extLst>
+              <a:ext uri="{FF2B5EF4-FFF2-40B4-BE49-F238E27FC236}">
+                <a16:creationId xmlns:a16="http://schemas.microsoft.com/office/drawing/2014/main" id="{9DC7B766-D431-429A-9C44-131B8443066B}"/>
+              </a:ext>
+            </a:extLst>
+          </p:cNvPr>
+          <p:cNvSpPr txBox="1"/>
+          <p:nvPr/>
+        </p:nvSpPr>
+        <p:spPr>
+          <a:xfrm>
+            <a:off x="6089564" y="6442008"/>
+            <a:ext cx="1409469" cy="369332"/>
+          </a:xfrm>
+          <a:prstGeom prst="rect">
+            <a:avLst/>
+          </a:prstGeom>
+          <a:noFill/>
+        </p:spPr>
+        <p:txBody>
+          <a:bodyPr wrap="square" rtlCol="0">
+            <a:spAutoFit/>
+          </a:bodyPr>
+          <a:lstStyle/>
+          <a:p>
+            <a:pPr algn="just"/>
+            <a:r>
+              <a:rPr lang="fr-FR" dirty="0">
+                <a:latin typeface="Agency FB" panose="020B0503020202020204" pitchFamily="34" charset="0"/>
+              </a:rPr>
+              <a:t>Projet en groupe</a:t>
+            </a:r>
+          </a:p>
+        </p:txBody>
+      </p:sp>
+      <p:sp>
+        <p:nvSpPr>
+          <p:cNvPr id="18" name="ZoneTexte 17">
+            <a:extLst>
+              <a:ext uri="{FF2B5EF4-FFF2-40B4-BE49-F238E27FC236}">
+                <a16:creationId xmlns:a16="http://schemas.microsoft.com/office/drawing/2014/main" id="{ED65F325-4B0A-4F40-B53F-943C243EA84A}"/>
+              </a:ext>
+            </a:extLst>
+          </p:cNvPr>
+          <p:cNvSpPr txBox="1"/>
+          <p:nvPr/>
+        </p:nvSpPr>
+        <p:spPr>
+          <a:xfrm>
+            <a:off x="8071644" y="6442008"/>
+            <a:ext cx="1409468" cy="369332"/>
+          </a:xfrm>
+          <a:prstGeom prst="rect">
+            <a:avLst/>
+          </a:prstGeom>
+          <a:noFill/>
+        </p:spPr>
+        <p:txBody>
+          <a:bodyPr wrap="square" rtlCol="0">
+            <a:spAutoFit/>
+          </a:bodyPr>
+          <a:lstStyle/>
+          <a:p>
+            <a:pPr algn="just"/>
+            <a:r>
+              <a:rPr lang="fr-FR" dirty="0">
+                <a:latin typeface="Agency FB" panose="020B0503020202020204" pitchFamily="34" charset="0"/>
+              </a:rPr>
+              <a:t>Projet personnel</a:t>
+            </a:r>
+          </a:p>
+        </p:txBody>
+      </p:sp>
+      <p:sp>
+        <p:nvSpPr>
+          <p:cNvPr id="19" name="ZoneTexte 18">
+            <a:extLst>
+              <a:ext uri="{FF2B5EF4-FFF2-40B4-BE49-F238E27FC236}">
+                <a16:creationId xmlns:a16="http://schemas.microsoft.com/office/drawing/2014/main" id="{B9836F88-72B5-41C1-98A0-BE1514F0A098}"/>
+              </a:ext>
+            </a:extLst>
+          </p:cNvPr>
+          <p:cNvSpPr txBox="1"/>
+          <p:nvPr/>
+        </p:nvSpPr>
+        <p:spPr>
+          <a:xfrm>
+            <a:off x="10053722" y="6442008"/>
+            <a:ext cx="1040998" cy="369332"/>
+          </a:xfrm>
+          <a:prstGeom prst="rect">
+            <a:avLst/>
+          </a:prstGeom>
+          <a:noFill/>
+        </p:spPr>
+        <p:txBody>
+          <a:bodyPr wrap="square" rtlCol="0">
+            <a:spAutoFit/>
+          </a:bodyPr>
+          <a:lstStyle/>
+          <a:p>
+            <a:pPr algn="just"/>
+            <a:r>
+              <a:rPr lang="fr-FR" dirty="0">
+                <a:latin typeface="Agency FB" panose="020B0503020202020204" pitchFamily="34" charset="0"/>
+              </a:rPr>
+              <a:t>Conclusion</a:t>
+            </a:r>
+          </a:p>
+        </p:txBody>
+      </p:sp>
     </p:spTree>
     <p:extLst>
       <p:ext uri="{BB962C8B-B14F-4D97-AF65-F5344CB8AC3E}">
@@ -8537,6 +8989,46 @@
                                         <p:strVal val="visible"/>
                                       </p:to>
                                     </p:set>
+                                  </p:childTnLst>
+                                </p:cTn>
+                              </p:par>
+                            </p:childTnLst>
+                          </p:cTn>
+                        </p:par>
+                      </p:childTnLst>
+                    </p:cTn>
+                  </p:par>
+                  <p:par>
+                    <p:cTn id="9" fill="hold">
+                      <p:stCondLst>
+                        <p:cond delay="indefinite"/>
+                      </p:stCondLst>
+                      <p:childTnLst>
+                        <p:par>
+                          <p:cTn id="10" fill="hold">
+                            <p:stCondLst>
+                              <p:cond delay="0"/>
+                            </p:stCondLst>
+                            <p:childTnLst>
+                              <p:par>
+                                <p:cTn id="11" presetID="63" presetClass="path" presetSubtype="0" accel="50000" decel="50000" fill="hold" nodeType="clickEffect">
+                                  <p:stCondLst>
+                                    <p:cond delay="0"/>
+                                  </p:stCondLst>
+                                  <p:childTnLst>
+                                    <p:animMotion origin="layout" path="M -0.00312 -3.7037E-6 L 0.13919 -3.7037E-6 " pathEditMode="relative" rAng="0" ptsTypes="AA">
+                                      <p:cBhvr>
+                                        <p:cTn id="12" dur="2000" fill="hold"/>
+                                        <p:tgtEl>
+                                          <p:spTgt spid="9"/>
+                                        </p:tgtEl>
+                                        <p:attrNameLst>
+                                          <p:attrName>ppt_x</p:attrName>
+                                          <p:attrName>ppt_y</p:attrName>
+                                        </p:attrNameLst>
+                                      </p:cBhvr>
+                                      <p:rCtr x="7109" y="0"/>
+                                    </p:animMotion>
                                   </p:childTnLst>
                                 </p:cTn>
                               </p:par>
@@ -9349,6 +9841,231 @@
           </a:graphicData>
         </a:graphic>
       </p:graphicFrame>
+      <p:pic>
+        <p:nvPicPr>
+          <p:cNvPr id="12" name="Espace réservé du contenu 4">
+            <a:extLst>
+              <a:ext uri="{FF2B5EF4-FFF2-40B4-BE49-F238E27FC236}">
+                <a16:creationId xmlns:a16="http://schemas.microsoft.com/office/drawing/2014/main" id="{3C69298E-1883-4F73-B622-8F0A4DE99AA1}"/>
+              </a:ext>
+            </a:extLst>
+          </p:cNvPr>
+          <p:cNvPicPr>
+            <a:picLocks noGrp="1" noChangeAspect="1"/>
+          </p:cNvPicPr>
+          <p:nvPr>
+            <p:ph idx="1"/>
+          </p:nvPr>
+        </p:nvPicPr>
+        <p:blipFill>
+          <a:blip r:embed="rId2" cstate="print">
+            <a:extLst>
+              <a:ext uri="{28A0092B-C50C-407E-A947-70E740481C1C}">
+                <a14:useLocalDpi xmlns:a14="http://schemas.microsoft.com/office/drawing/2010/main" val="0"/>
+              </a:ext>
+            </a:extLst>
+          </a:blip>
+          <a:stretch>
+            <a:fillRect/>
+          </a:stretch>
+        </p:blipFill>
+        <p:spPr>
+          <a:xfrm>
+            <a:off x="1077076" y="6318665"/>
+            <a:ext cx="616018" cy="616018"/>
+          </a:xfrm>
+        </p:spPr>
+      </p:pic>
+      <p:sp>
+        <p:nvSpPr>
+          <p:cNvPr id="13" name="ZoneTexte 12">
+            <a:extLst>
+              <a:ext uri="{FF2B5EF4-FFF2-40B4-BE49-F238E27FC236}">
+                <a16:creationId xmlns:a16="http://schemas.microsoft.com/office/drawing/2014/main" id="{66A84861-5292-43C8-AEF2-4AE47B1E5F39}"/>
+              </a:ext>
+            </a:extLst>
+          </p:cNvPr>
+          <p:cNvSpPr txBox="1"/>
+          <p:nvPr/>
+        </p:nvSpPr>
+        <p:spPr>
+          <a:xfrm>
+            <a:off x="1693094" y="6442008"/>
+            <a:ext cx="1068371" cy="369332"/>
+          </a:xfrm>
+          <a:prstGeom prst="rect">
+            <a:avLst/>
+          </a:prstGeom>
+          <a:noFill/>
+        </p:spPr>
+        <p:txBody>
+          <a:bodyPr wrap="square" rtlCol="0">
+            <a:spAutoFit/>
+          </a:bodyPr>
+          <a:lstStyle/>
+          <a:p>
+            <a:pPr algn="just"/>
+            <a:r>
+              <a:rPr lang="fr-FR" dirty="0">
+                <a:latin typeface="Agency FB" panose="020B0503020202020204" pitchFamily="34" charset="0"/>
+              </a:rPr>
+              <a:t>Introduction</a:t>
+            </a:r>
+          </a:p>
+        </p:txBody>
+      </p:sp>
+      <p:sp>
+        <p:nvSpPr>
+          <p:cNvPr id="14" name="ZoneTexte 13">
+            <a:extLst>
+              <a:ext uri="{FF2B5EF4-FFF2-40B4-BE49-F238E27FC236}">
+                <a16:creationId xmlns:a16="http://schemas.microsoft.com/office/drawing/2014/main" id="{F991C64A-2269-4532-A809-EBF3EEADD7B1}"/>
+              </a:ext>
+            </a:extLst>
+          </p:cNvPr>
+          <p:cNvSpPr txBox="1"/>
+          <p:nvPr/>
+        </p:nvSpPr>
+        <p:spPr>
+          <a:xfrm>
+            <a:off x="3409929" y="6442008"/>
+            <a:ext cx="2107025" cy="369332"/>
+          </a:xfrm>
+          <a:prstGeom prst="rect">
+            <a:avLst/>
+          </a:prstGeom>
+          <a:noFill/>
+        </p:spPr>
+        <p:txBody>
+          <a:bodyPr wrap="square" rtlCol="0">
+            <a:spAutoFit/>
+          </a:bodyPr>
+          <a:lstStyle/>
+          <a:p>
+            <a:pPr algn="just"/>
+            <a:r>
+              <a:rPr lang="fr-FR" dirty="0">
+                <a:latin typeface="Agency FB" panose="020B0503020202020204" pitchFamily="34" charset="0"/>
+              </a:rPr>
+              <a:t>Présentation de PROXIDEJ</a:t>
+            </a:r>
+          </a:p>
+        </p:txBody>
+      </p:sp>
+      <p:sp>
+        <p:nvSpPr>
+          <p:cNvPr id="15" name="ZoneTexte 14">
+            <a:extLst>
+              <a:ext uri="{FF2B5EF4-FFF2-40B4-BE49-F238E27FC236}">
+                <a16:creationId xmlns:a16="http://schemas.microsoft.com/office/drawing/2014/main" id="{72E43E08-6219-499B-91D6-EC39B11225BF}"/>
+              </a:ext>
+            </a:extLst>
+          </p:cNvPr>
+          <p:cNvSpPr txBox="1"/>
+          <p:nvPr/>
+        </p:nvSpPr>
+        <p:spPr>
+          <a:xfrm>
+            <a:off x="6089564" y="6442008"/>
+            <a:ext cx="1409469" cy="369332"/>
+          </a:xfrm>
+          <a:prstGeom prst="rect">
+            <a:avLst/>
+          </a:prstGeom>
+          <a:noFill/>
+        </p:spPr>
+        <p:txBody>
+          <a:bodyPr wrap="square" rtlCol="0">
+            <a:spAutoFit/>
+          </a:bodyPr>
+          <a:lstStyle/>
+          <a:p>
+            <a:pPr algn="just"/>
+            <a:r>
+              <a:rPr lang="fr-FR" dirty="0">
+                <a:latin typeface="Agency FB" panose="020B0503020202020204" pitchFamily="34" charset="0"/>
+              </a:rPr>
+              <a:t>Projet en groupe</a:t>
+            </a:r>
+          </a:p>
+        </p:txBody>
+      </p:sp>
+      <p:sp>
+        <p:nvSpPr>
+          <p:cNvPr id="16" name="ZoneTexte 15">
+            <a:extLst>
+              <a:ext uri="{FF2B5EF4-FFF2-40B4-BE49-F238E27FC236}">
+                <a16:creationId xmlns:a16="http://schemas.microsoft.com/office/drawing/2014/main" id="{7AE77000-C5F8-4F23-BE28-E03B105AB0C2}"/>
+              </a:ext>
+            </a:extLst>
+          </p:cNvPr>
+          <p:cNvSpPr txBox="1"/>
+          <p:nvPr/>
+        </p:nvSpPr>
+        <p:spPr>
+          <a:xfrm>
+            <a:off x="8071644" y="6442008"/>
+            <a:ext cx="1409468" cy="369332"/>
+          </a:xfrm>
+          <a:prstGeom prst="rect">
+            <a:avLst/>
+          </a:prstGeom>
+          <a:noFill/>
+        </p:spPr>
+        <p:txBody>
+          <a:bodyPr wrap="square" rtlCol="0">
+            <a:spAutoFit/>
+          </a:bodyPr>
+          <a:lstStyle/>
+          <a:p>
+            <a:pPr algn="just"/>
+            <a:r>
+              <a:rPr lang="fr-FR" dirty="0">
+                <a:latin typeface="Agency FB" panose="020B0503020202020204" pitchFamily="34" charset="0"/>
+              </a:rPr>
+              <a:t>Projet personnel</a:t>
+            </a:r>
+          </a:p>
+        </p:txBody>
+      </p:sp>
+      <p:sp>
+        <p:nvSpPr>
+          <p:cNvPr id="17" name="ZoneTexte 16">
+            <a:extLst>
+              <a:ext uri="{FF2B5EF4-FFF2-40B4-BE49-F238E27FC236}">
+                <a16:creationId xmlns:a16="http://schemas.microsoft.com/office/drawing/2014/main" id="{EB699732-0172-4002-9B88-1A5621642E23}"/>
+              </a:ext>
+            </a:extLst>
+          </p:cNvPr>
+          <p:cNvSpPr txBox="1"/>
+          <p:nvPr/>
+        </p:nvSpPr>
+        <p:spPr>
+          <a:xfrm>
+            <a:off x="10053722" y="6442008"/>
+            <a:ext cx="1040998" cy="369332"/>
+          </a:xfrm>
+          <a:prstGeom prst="rect">
+            <a:avLst/>
+          </a:prstGeom>
+          <a:noFill/>
+        </p:spPr>
+        <p:txBody>
+          <a:bodyPr wrap="square" rtlCol="0">
+            <a:spAutoFit/>
+          </a:bodyPr>
+          <a:lstStyle/>
+          <a:p>
+            <a:pPr algn="just"/>
+            <a:r>
+              <a:rPr lang="fr-FR" dirty="0">
+                <a:latin typeface="Agency FB" panose="020B0503020202020204" pitchFamily="34" charset="0"/>
+              </a:rPr>
+              <a:t>Conclusion</a:t>
+            </a:r>
+          </a:p>
+        </p:txBody>
+      </p:sp>
     </p:spTree>
     <p:extLst>
       <p:ext uri="{BB962C8B-B14F-4D97-AF65-F5344CB8AC3E}">
@@ -9754,7 +10471,7 @@
                   <a:schemeClr val="tx1"/>
                 </a:solidFill>
               </a:rPr>
-              <a:t>Créer</a:t>
+              <a:t>Créée</a:t>
             </a:r>
             <a:r>
               <a:rPr lang="en-US" dirty="0">
@@ -9771,7 +10488,7 @@
                   <a:schemeClr val="tx1"/>
                 </a:solidFill>
               </a:rPr>
-              <a:t> le 24 Avril 2010</a:t>
+              <a:t>  le 24 Avril 2010</a:t>
             </a:r>
           </a:p>
           <a:p>
@@ -10058,6 +10775,231 @@
           </a:prstGeom>
         </p:spPr>
       </p:pic>
+      <p:sp>
+        <p:nvSpPr>
+          <p:cNvPr id="7" name="ZoneTexte 6">
+            <a:extLst>
+              <a:ext uri="{FF2B5EF4-FFF2-40B4-BE49-F238E27FC236}">
+                <a16:creationId xmlns:a16="http://schemas.microsoft.com/office/drawing/2014/main" id="{B33501FE-C8F0-4C32-B27F-5D5275CD89B2}"/>
+              </a:ext>
+            </a:extLst>
+          </p:cNvPr>
+          <p:cNvSpPr txBox="1"/>
+          <p:nvPr/>
+        </p:nvSpPr>
+        <p:spPr>
+          <a:xfrm>
+            <a:off x="1693094" y="6442008"/>
+            <a:ext cx="1068371" cy="369332"/>
+          </a:xfrm>
+          <a:prstGeom prst="rect">
+            <a:avLst/>
+          </a:prstGeom>
+          <a:noFill/>
+        </p:spPr>
+        <p:txBody>
+          <a:bodyPr wrap="square" rtlCol="0">
+            <a:spAutoFit/>
+          </a:bodyPr>
+          <a:lstStyle/>
+          <a:p>
+            <a:pPr algn="just"/>
+            <a:r>
+              <a:rPr lang="fr-FR" dirty="0">
+                <a:latin typeface="Agency FB" panose="020B0503020202020204" pitchFamily="34" charset="0"/>
+              </a:rPr>
+              <a:t>Introduction</a:t>
+            </a:r>
+          </a:p>
+        </p:txBody>
+      </p:sp>
+      <p:sp>
+        <p:nvSpPr>
+          <p:cNvPr id="9" name="ZoneTexte 8">
+            <a:extLst>
+              <a:ext uri="{FF2B5EF4-FFF2-40B4-BE49-F238E27FC236}">
+                <a16:creationId xmlns:a16="http://schemas.microsoft.com/office/drawing/2014/main" id="{BD66646D-7377-45D8-8126-D20EE9C07604}"/>
+              </a:ext>
+            </a:extLst>
+          </p:cNvPr>
+          <p:cNvSpPr txBox="1"/>
+          <p:nvPr/>
+        </p:nvSpPr>
+        <p:spPr>
+          <a:xfrm>
+            <a:off x="3409929" y="6442008"/>
+            <a:ext cx="2107025" cy="369332"/>
+          </a:xfrm>
+          <a:prstGeom prst="rect">
+            <a:avLst/>
+          </a:prstGeom>
+          <a:noFill/>
+        </p:spPr>
+        <p:txBody>
+          <a:bodyPr wrap="square" rtlCol="0">
+            <a:spAutoFit/>
+          </a:bodyPr>
+          <a:lstStyle/>
+          <a:p>
+            <a:pPr algn="just"/>
+            <a:r>
+              <a:rPr lang="fr-FR" dirty="0">
+                <a:latin typeface="Agency FB" panose="020B0503020202020204" pitchFamily="34" charset="0"/>
+              </a:rPr>
+              <a:t>Présentation de PROXIDEJ</a:t>
+            </a:r>
+          </a:p>
+        </p:txBody>
+      </p:sp>
+      <p:sp>
+        <p:nvSpPr>
+          <p:cNvPr id="11" name="ZoneTexte 10">
+            <a:extLst>
+              <a:ext uri="{FF2B5EF4-FFF2-40B4-BE49-F238E27FC236}">
+                <a16:creationId xmlns:a16="http://schemas.microsoft.com/office/drawing/2014/main" id="{8718225E-1A4C-407C-B8EB-D8EE18798521}"/>
+              </a:ext>
+            </a:extLst>
+          </p:cNvPr>
+          <p:cNvSpPr txBox="1"/>
+          <p:nvPr/>
+        </p:nvSpPr>
+        <p:spPr>
+          <a:xfrm>
+            <a:off x="6089564" y="6442008"/>
+            <a:ext cx="1409469" cy="369332"/>
+          </a:xfrm>
+          <a:prstGeom prst="rect">
+            <a:avLst/>
+          </a:prstGeom>
+          <a:noFill/>
+        </p:spPr>
+        <p:txBody>
+          <a:bodyPr wrap="square" rtlCol="0">
+            <a:spAutoFit/>
+          </a:bodyPr>
+          <a:lstStyle/>
+          <a:p>
+            <a:pPr algn="just"/>
+            <a:r>
+              <a:rPr lang="fr-FR" dirty="0">
+                <a:latin typeface="Agency FB" panose="020B0503020202020204" pitchFamily="34" charset="0"/>
+              </a:rPr>
+              <a:t>Projet en groupe</a:t>
+            </a:r>
+          </a:p>
+        </p:txBody>
+      </p:sp>
+      <p:sp>
+        <p:nvSpPr>
+          <p:cNvPr id="12" name="ZoneTexte 11">
+            <a:extLst>
+              <a:ext uri="{FF2B5EF4-FFF2-40B4-BE49-F238E27FC236}">
+                <a16:creationId xmlns:a16="http://schemas.microsoft.com/office/drawing/2014/main" id="{DFAC067A-4438-4556-8435-4AE55F596DFC}"/>
+              </a:ext>
+            </a:extLst>
+          </p:cNvPr>
+          <p:cNvSpPr txBox="1"/>
+          <p:nvPr/>
+        </p:nvSpPr>
+        <p:spPr>
+          <a:xfrm>
+            <a:off x="8071644" y="6442008"/>
+            <a:ext cx="1409468" cy="369332"/>
+          </a:xfrm>
+          <a:prstGeom prst="rect">
+            <a:avLst/>
+          </a:prstGeom>
+          <a:noFill/>
+        </p:spPr>
+        <p:txBody>
+          <a:bodyPr wrap="square" rtlCol="0">
+            <a:spAutoFit/>
+          </a:bodyPr>
+          <a:lstStyle/>
+          <a:p>
+            <a:pPr algn="just"/>
+            <a:r>
+              <a:rPr lang="fr-FR" dirty="0">
+                <a:latin typeface="Agency FB" panose="020B0503020202020204" pitchFamily="34" charset="0"/>
+              </a:rPr>
+              <a:t>Projet personnel</a:t>
+            </a:r>
+          </a:p>
+        </p:txBody>
+      </p:sp>
+      <p:sp>
+        <p:nvSpPr>
+          <p:cNvPr id="13" name="ZoneTexte 12">
+            <a:extLst>
+              <a:ext uri="{FF2B5EF4-FFF2-40B4-BE49-F238E27FC236}">
+                <a16:creationId xmlns:a16="http://schemas.microsoft.com/office/drawing/2014/main" id="{6D4A2B55-4B00-42EB-94C6-909878C2B82B}"/>
+              </a:ext>
+            </a:extLst>
+          </p:cNvPr>
+          <p:cNvSpPr txBox="1"/>
+          <p:nvPr/>
+        </p:nvSpPr>
+        <p:spPr>
+          <a:xfrm>
+            <a:off x="10053722" y="6442008"/>
+            <a:ext cx="1040998" cy="369332"/>
+          </a:xfrm>
+          <a:prstGeom prst="rect">
+            <a:avLst/>
+          </a:prstGeom>
+          <a:noFill/>
+        </p:spPr>
+        <p:txBody>
+          <a:bodyPr wrap="square" rtlCol="0">
+            <a:spAutoFit/>
+          </a:bodyPr>
+          <a:lstStyle/>
+          <a:p>
+            <a:pPr algn="just"/>
+            <a:r>
+              <a:rPr lang="fr-FR" dirty="0">
+                <a:latin typeface="Agency FB" panose="020B0503020202020204" pitchFamily="34" charset="0"/>
+              </a:rPr>
+              <a:t>Conclusion</a:t>
+            </a:r>
+          </a:p>
+        </p:txBody>
+      </p:sp>
+      <p:pic>
+        <p:nvPicPr>
+          <p:cNvPr id="14" name="Espace réservé du contenu 4">
+            <a:extLst>
+              <a:ext uri="{FF2B5EF4-FFF2-40B4-BE49-F238E27FC236}">
+                <a16:creationId xmlns:a16="http://schemas.microsoft.com/office/drawing/2014/main" id="{C5EF91B9-1A61-498E-9B1C-8A375E2B76B4}"/>
+              </a:ext>
+            </a:extLst>
+          </p:cNvPr>
+          <p:cNvPicPr>
+            <a:picLocks noGrp="1" noChangeAspect="1"/>
+          </p:cNvPicPr>
+          <p:nvPr>
+            <p:ph idx="1"/>
+          </p:nvPr>
+        </p:nvPicPr>
+        <p:blipFill>
+          <a:blip r:embed="rId5" cstate="print">
+            <a:extLst>
+              <a:ext uri="{28A0092B-C50C-407E-A947-70E740481C1C}">
+                <a14:useLocalDpi xmlns:a14="http://schemas.microsoft.com/office/drawing/2010/main" val="0"/>
+              </a:ext>
+            </a:extLst>
+          </a:blip>
+          <a:stretch>
+            <a:fillRect/>
+          </a:stretch>
+        </p:blipFill>
+        <p:spPr>
+          <a:xfrm>
+            <a:off x="2777688" y="6318665"/>
+            <a:ext cx="616018" cy="616018"/>
+          </a:xfrm>
+        </p:spPr>
+      </p:pic>
     </p:spTree>
     <p:extLst>
       <p:ext uri="{BB962C8B-B14F-4D97-AF65-F5344CB8AC3E}">
@@ -10068,6 +11010,76 @@
   <p:clrMapOvr>
     <a:masterClrMapping/>
   </p:clrMapOvr>
+  <p:timing>
+    <p:tnLst>
+      <p:par>
+        <p:cTn id="1" dur="indefinite" restart="never" nodeType="tmRoot">
+          <p:childTnLst>
+            <p:seq concurrent="1" nextAc="seek">
+              <p:cTn id="2" dur="indefinite" nodeType="mainSeq">
+                <p:childTnLst>
+                  <p:par>
+                    <p:cTn id="3" fill="hold">
+                      <p:stCondLst>
+                        <p:cond delay="indefinite"/>
+                      </p:stCondLst>
+                      <p:childTnLst>
+                        <p:par>
+                          <p:cTn id="4" fill="hold">
+                            <p:stCondLst>
+                              <p:cond delay="0"/>
+                            </p:stCondLst>
+                            <p:childTnLst>
+                              <p:par>
+                                <p:cTn id="5" presetID="63" presetClass="path" presetSubtype="0" accel="50000" decel="50000" fill="hold" nodeType="clickEffect">
+                                  <p:stCondLst>
+                                    <p:cond delay="0"/>
+                                  </p:stCondLst>
+                                  <p:childTnLst>
+                                    <p:animMotion origin="layout" path="M 5E-6 -3.7037E-6 L 0.22188 -3.7037E-6 " pathEditMode="relative" rAng="0" ptsTypes="AA">
+                                      <p:cBhvr>
+                                        <p:cTn id="6" dur="2000" fill="hold"/>
+                                        <p:tgtEl>
+                                          <p:spTgt spid="14"/>
+                                        </p:tgtEl>
+                                        <p:attrNameLst>
+                                          <p:attrName>ppt_x</p:attrName>
+                                          <p:attrName>ppt_y</p:attrName>
+                                        </p:attrNameLst>
+                                      </p:cBhvr>
+                                      <p:rCtr x="11094" y="0"/>
+                                    </p:animMotion>
+                                  </p:childTnLst>
+                                </p:cTn>
+                              </p:par>
+                            </p:childTnLst>
+                          </p:cTn>
+                        </p:par>
+                      </p:childTnLst>
+                    </p:cTn>
+                  </p:par>
+                </p:childTnLst>
+              </p:cTn>
+              <p:prevCondLst>
+                <p:cond evt="onPrev" delay="0">
+                  <p:tgtEl>
+                    <p:sldTgt/>
+                  </p:tgtEl>
+                </p:cond>
+              </p:prevCondLst>
+              <p:nextCondLst>
+                <p:cond evt="onNext" delay="0">
+                  <p:tgtEl>
+                    <p:sldTgt/>
+                  </p:tgtEl>
+                </p:cond>
+              </p:nextCondLst>
+            </p:seq>
+          </p:childTnLst>
+        </p:cTn>
+      </p:par>
+    </p:tnLst>
+  </p:timing>
 </p:sld>
 </file>
 
@@ -10317,7 +11329,7 @@
           <a:lstStyle/>
           <a:p>
             <a:pPr algn="ctr"/>
-            <a:endParaRPr lang="en-US"/>
+            <a:endParaRPr lang="fr-FR" dirty="0"/>
           </a:p>
         </p:txBody>
       </p:sp>
@@ -10351,7 +11363,7 @@
           <a:p>
             <a:pPr algn="r"/>
             <a:r>
-              <a:rPr lang="en-US" sz="8000">
+              <a:rPr lang="fr-FR" sz="8000" dirty="0">
                 <a:ln>
                   <a:solidFill>
                     <a:srgbClr val="000000">
@@ -10375,9 +11387,9 @@
                   </a:outerShdw>
                 </a:effectLst>
               </a:rPr>
-              <a:t>Presentation projet</a:t>
-            </a:r>
-            <a:endParaRPr lang="en-US" sz="8000">
+              <a:t>Présentation projet en groupe</a:t>
+            </a:r>
+            <a:endParaRPr lang="fr-FR" sz="8000" dirty="0">
               <a:solidFill>
                 <a:schemeClr val="tx1">
                   <a:lumMod val="85000"/>
@@ -10550,10 +11562,993 @@
           </a:fontRef>
         </p:style>
       </p:sp>
+      <p:pic>
+        <p:nvPicPr>
+          <p:cNvPr id="10" name="Espace réservé du contenu 4">
+            <a:extLst>
+              <a:ext uri="{FF2B5EF4-FFF2-40B4-BE49-F238E27FC236}">
+                <a16:creationId xmlns:a16="http://schemas.microsoft.com/office/drawing/2014/main" id="{86148357-8FFE-49EA-8D2B-4F1D0FE6CCA5}"/>
+              </a:ext>
+            </a:extLst>
+          </p:cNvPr>
+          <p:cNvPicPr>
+            <a:picLocks noGrp="1" noChangeAspect="1"/>
+          </p:cNvPicPr>
+          <p:nvPr>
+            <p:ph idx="1"/>
+          </p:nvPr>
+        </p:nvPicPr>
+        <p:blipFill>
+          <a:blip r:embed="rId2" cstate="print">
+            <a:extLst>
+              <a:ext uri="{28A0092B-C50C-407E-A947-70E740481C1C}">
+                <a14:useLocalDpi xmlns:a14="http://schemas.microsoft.com/office/drawing/2010/main" val="0"/>
+              </a:ext>
+            </a:extLst>
+          </a:blip>
+          <a:stretch>
+            <a:fillRect/>
+          </a:stretch>
+        </p:blipFill>
+        <p:spPr>
+          <a:xfrm>
+            <a:off x="5473546" y="6318665"/>
+            <a:ext cx="616018" cy="616018"/>
+          </a:xfrm>
+        </p:spPr>
+      </p:pic>
+      <p:sp>
+        <p:nvSpPr>
+          <p:cNvPr id="12" name="ZoneTexte 11">
+            <a:extLst>
+              <a:ext uri="{FF2B5EF4-FFF2-40B4-BE49-F238E27FC236}">
+                <a16:creationId xmlns:a16="http://schemas.microsoft.com/office/drawing/2014/main" id="{2391DCBF-530B-45E9-868B-B51CBFC7BD42}"/>
+              </a:ext>
+            </a:extLst>
+          </p:cNvPr>
+          <p:cNvSpPr txBox="1"/>
+          <p:nvPr/>
+        </p:nvSpPr>
+        <p:spPr>
+          <a:xfrm>
+            <a:off x="1693094" y="6442008"/>
+            <a:ext cx="1068371" cy="369332"/>
+          </a:xfrm>
+          <a:prstGeom prst="rect">
+            <a:avLst/>
+          </a:prstGeom>
+          <a:noFill/>
+        </p:spPr>
+        <p:txBody>
+          <a:bodyPr wrap="square" rtlCol="0">
+            <a:spAutoFit/>
+          </a:bodyPr>
+          <a:lstStyle/>
+          <a:p>
+            <a:pPr algn="just"/>
+            <a:r>
+              <a:rPr lang="fr-FR" dirty="0">
+                <a:latin typeface="Agency FB" panose="020B0503020202020204" pitchFamily="34" charset="0"/>
+              </a:rPr>
+              <a:t>Introduction</a:t>
+            </a:r>
+          </a:p>
+        </p:txBody>
+      </p:sp>
+      <p:sp>
+        <p:nvSpPr>
+          <p:cNvPr id="14" name="ZoneTexte 13">
+            <a:extLst>
+              <a:ext uri="{FF2B5EF4-FFF2-40B4-BE49-F238E27FC236}">
+                <a16:creationId xmlns:a16="http://schemas.microsoft.com/office/drawing/2014/main" id="{D03FBFB2-C874-4F33-9C21-097FB87E5829}"/>
+              </a:ext>
+            </a:extLst>
+          </p:cNvPr>
+          <p:cNvSpPr txBox="1"/>
+          <p:nvPr/>
+        </p:nvSpPr>
+        <p:spPr>
+          <a:xfrm>
+            <a:off x="3409930" y="6442008"/>
+            <a:ext cx="2107024" cy="369332"/>
+          </a:xfrm>
+          <a:prstGeom prst="rect">
+            <a:avLst/>
+          </a:prstGeom>
+          <a:noFill/>
+        </p:spPr>
+        <p:txBody>
+          <a:bodyPr wrap="square" rtlCol="0">
+            <a:spAutoFit/>
+          </a:bodyPr>
+          <a:lstStyle/>
+          <a:p>
+            <a:pPr algn="just"/>
+            <a:r>
+              <a:rPr lang="fr-FR" dirty="0">
+                <a:latin typeface="Agency FB" panose="020B0503020202020204" pitchFamily="34" charset="0"/>
+              </a:rPr>
+              <a:t>Présentation de PROXIDEJ</a:t>
+            </a:r>
+          </a:p>
+        </p:txBody>
+      </p:sp>
+      <p:sp>
+        <p:nvSpPr>
+          <p:cNvPr id="16" name="ZoneTexte 15">
+            <a:extLst>
+              <a:ext uri="{FF2B5EF4-FFF2-40B4-BE49-F238E27FC236}">
+                <a16:creationId xmlns:a16="http://schemas.microsoft.com/office/drawing/2014/main" id="{0E7655C1-47DE-4B9D-B8A9-D0ACAFE171F1}"/>
+              </a:ext>
+            </a:extLst>
+          </p:cNvPr>
+          <p:cNvSpPr txBox="1"/>
+          <p:nvPr/>
+        </p:nvSpPr>
+        <p:spPr>
+          <a:xfrm>
+            <a:off x="6089564" y="6442008"/>
+            <a:ext cx="1409469" cy="369332"/>
+          </a:xfrm>
+          <a:prstGeom prst="rect">
+            <a:avLst/>
+          </a:prstGeom>
+          <a:noFill/>
+        </p:spPr>
+        <p:txBody>
+          <a:bodyPr wrap="square" rtlCol="0">
+            <a:spAutoFit/>
+          </a:bodyPr>
+          <a:lstStyle/>
+          <a:p>
+            <a:pPr algn="just"/>
+            <a:r>
+              <a:rPr lang="fr-FR" dirty="0">
+                <a:latin typeface="Agency FB" panose="020B0503020202020204" pitchFamily="34" charset="0"/>
+              </a:rPr>
+              <a:t>Projet en groupe</a:t>
+            </a:r>
+          </a:p>
+        </p:txBody>
+      </p:sp>
+      <p:sp>
+        <p:nvSpPr>
+          <p:cNvPr id="18" name="ZoneTexte 17">
+            <a:extLst>
+              <a:ext uri="{FF2B5EF4-FFF2-40B4-BE49-F238E27FC236}">
+                <a16:creationId xmlns:a16="http://schemas.microsoft.com/office/drawing/2014/main" id="{A362FED8-5749-47CE-8F6F-D5A33F002A7B}"/>
+              </a:ext>
+            </a:extLst>
+          </p:cNvPr>
+          <p:cNvSpPr txBox="1"/>
+          <p:nvPr/>
+        </p:nvSpPr>
+        <p:spPr>
+          <a:xfrm>
+            <a:off x="8071644" y="6442008"/>
+            <a:ext cx="1409468" cy="369332"/>
+          </a:xfrm>
+          <a:prstGeom prst="rect">
+            <a:avLst/>
+          </a:prstGeom>
+          <a:noFill/>
+        </p:spPr>
+        <p:txBody>
+          <a:bodyPr wrap="square" rtlCol="0">
+            <a:spAutoFit/>
+          </a:bodyPr>
+          <a:lstStyle/>
+          <a:p>
+            <a:pPr algn="just"/>
+            <a:r>
+              <a:rPr lang="fr-FR" dirty="0">
+                <a:latin typeface="Agency FB" panose="020B0503020202020204" pitchFamily="34" charset="0"/>
+              </a:rPr>
+              <a:t>Projet personnel</a:t>
+            </a:r>
+          </a:p>
+        </p:txBody>
+      </p:sp>
+      <p:sp>
+        <p:nvSpPr>
+          <p:cNvPr id="20" name="ZoneTexte 19">
+            <a:extLst>
+              <a:ext uri="{FF2B5EF4-FFF2-40B4-BE49-F238E27FC236}">
+                <a16:creationId xmlns:a16="http://schemas.microsoft.com/office/drawing/2014/main" id="{C23D51BD-08D5-46E4-B7EA-5F25BDE8DC94}"/>
+              </a:ext>
+            </a:extLst>
+          </p:cNvPr>
+          <p:cNvSpPr txBox="1"/>
+          <p:nvPr/>
+        </p:nvSpPr>
+        <p:spPr>
+          <a:xfrm>
+            <a:off x="10053722" y="6442008"/>
+            <a:ext cx="1040998" cy="369332"/>
+          </a:xfrm>
+          <a:prstGeom prst="rect">
+            <a:avLst/>
+          </a:prstGeom>
+          <a:noFill/>
+        </p:spPr>
+        <p:txBody>
+          <a:bodyPr wrap="square" rtlCol="0">
+            <a:spAutoFit/>
+          </a:bodyPr>
+          <a:lstStyle/>
+          <a:p>
+            <a:pPr algn="just"/>
+            <a:r>
+              <a:rPr lang="fr-FR" dirty="0">
+                <a:latin typeface="Agency FB" panose="020B0503020202020204" pitchFamily="34" charset="0"/>
+              </a:rPr>
+              <a:t>Conclusion</a:t>
+            </a:r>
+          </a:p>
+        </p:txBody>
+      </p:sp>
     </p:spTree>
     <p:extLst>
       <p:ext uri="{BB962C8B-B14F-4D97-AF65-F5344CB8AC3E}">
         <p14:creationId xmlns:p14="http://schemas.microsoft.com/office/powerpoint/2010/main" val="2437217495"/>
+      </p:ext>
+    </p:extLst>
+  </p:cSld>
+  <p:clrMapOvr>
+    <a:masterClrMapping/>
+  </p:clrMapOvr>
+  <p:timing>
+    <p:tnLst>
+      <p:par>
+        <p:cTn id="1" dur="indefinite" restart="never" nodeType="tmRoot">
+          <p:childTnLst>
+            <p:seq concurrent="1" nextAc="seek">
+              <p:cTn id="2" dur="indefinite" nodeType="mainSeq">
+                <p:childTnLst>
+                  <p:par>
+                    <p:cTn id="3" fill="hold">
+                      <p:stCondLst>
+                        <p:cond delay="indefinite"/>
+                      </p:stCondLst>
+                      <p:childTnLst>
+                        <p:par>
+                          <p:cTn id="4" fill="hold">
+                            <p:stCondLst>
+                              <p:cond delay="0"/>
+                            </p:stCondLst>
+                            <p:childTnLst>
+                              <p:par>
+                                <p:cTn id="5" presetID="63" presetClass="path" presetSubtype="0" accel="50000" decel="50000" fill="hold" nodeType="clickEffect">
+                                  <p:stCondLst>
+                                    <p:cond delay="0"/>
+                                  </p:stCondLst>
+                                  <p:childTnLst>
+                                    <p:animMotion origin="layout" path="M 1.25E-6 -3.7037E-6 L 0.16641 -3.7037E-6 " pathEditMode="relative" rAng="0" ptsTypes="AA">
+                                      <p:cBhvr>
+                                        <p:cTn id="6" dur="2000" fill="hold"/>
+                                        <p:tgtEl>
+                                          <p:spTgt spid="10"/>
+                                        </p:tgtEl>
+                                        <p:attrNameLst>
+                                          <p:attrName>ppt_x</p:attrName>
+                                          <p:attrName>ppt_y</p:attrName>
+                                        </p:attrNameLst>
+                                      </p:cBhvr>
+                                      <p:rCtr x="8320" y="0"/>
+                                    </p:animMotion>
+                                  </p:childTnLst>
+                                </p:cTn>
+                              </p:par>
+                            </p:childTnLst>
+                          </p:cTn>
+                        </p:par>
+                      </p:childTnLst>
+                    </p:cTn>
+                  </p:par>
+                </p:childTnLst>
+              </p:cTn>
+              <p:prevCondLst>
+                <p:cond evt="onPrev" delay="0">
+                  <p:tgtEl>
+                    <p:sldTgt/>
+                  </p:tgtEl>
+                </p:cond>
+              </p:prevCondLst>
+              <p:nextCondLst>
+                <p:cond evt="onNext" delay="0">
+                  <p:tgtEl>
+                    <p:sldTgt/>
+                  </p:tgtEl>
+                </p:cond>
+              </p:nextCondLst>
+            </p:seq>
+          </p:childTnLst>
+        </p:cTn>
+      </p:par>
+    </p:tnLst>
+  </p:timing>
+</p:sld>
+</file>
+
+<file path=ppt/slides/slide8.xml><?xml version="1.0" encoding="utf-8"?>
+<p:sld xmlns:a="http://schemas.openxmlformats.org/drawingml/2006/main" xmlns:r="http://schemas.openxmlformats.org/officeDocument/2006/relationships" xmlns:p="http://schemas.openxmlformats.org/presentationml/2006/main">
+  <p:cSld>
+    <p:spTree>
+      <p:nvGrpSpPr>
+        <p:cNvPr id="1" name=""/>
+        <p:cNvGrpSpPr/>
+        <p:nvPr/>
+      </p:nvGrpSpPr>
+      <p:grpSpPr>
+        <a:xfrm>
+          <a:off x="0" y="0"/>
+          <a:ext cx="0" cy="0"/>
+          <a:chOff x="0" y="0"/>
+          <a:chExt cx="0" cy="0"/>
+        </a:xfrm>
+      </p:grpSpPr>
+      <p:sp>
+        <p:nvSpPr>
+          <p:cNvPr id="2" name="Titre 1">
+            <a:extLst>
+              <a:ext uri="{FF2B5EF4-FFF2-40B4-BE49-F238E27FC236}">
+                <a16:creationId xmlns:a16="http://schemas.microsoft.com/office/drawing/2014/main" id="{FB3D87DC-1F1D-44F6-BF92-FACAE24261D3}"/>
+              </a:ext>
+            </a:extLst>
+          </p:cNvPr>
+          <p:cNvSpPr>
+            <a:spLocks noGrp="1"/>
+          </p:cNvSpPr>
+          <p:nvPr>
+            <p:ph type="title"/>
+          </p:nvPr>
+        </p:nvSpPr>
+        <p:spPr/>
+        <p:txBody>
+          <a:bodyPr/>
+          <a:lstStyle/>
+          <a:p>
+            <a:r>
+              <a:rPr lang="fr-FR" dirty="0"/>
+              <a:t>Présentation personnelle</a:t>
+            </a:r>
+          </a:p>
+        </p:txBody>
+      </p:sp>
+      <p:sp>
+        <p:nvSpPr>
+          <p:cNvPr id="3" name="Espace réservé du contenu 2">
+            <a:extLst>
+              <a:ext uri="{FF2B5EF4-FFF2-40B4-BE49-F238E27FC236}">
+                <a16:creationId xmlns:a16="http://schemas.microsoft.com/office/drawing/2014/main" id="{B4876BF3-9D0A-46E1-9ED3-5C2504859891}"/>
+              </a:ext>
+            </a:extLst>
+          </p:cNvPr>
+          <p:cNvSpPr>
+            <a:spLocks noGrp="1"/>
+          </p:cNvSpPr>
+          <p:nvPr>
+            <p:ph idx="1"/>
+          </p:nvPr>
+        </p:nvSpPr>
+        <p:spPr/>
+        <p:txBody>
+          <a:bodyPr/>
+          <a:lstStyle/>
+          <a:p>
+            <a:endParaRPr lang="fr-FR"/>
+          </a:p>
+        </p:txBody>
+      </p:sp>
+      <p:pic>
+        <p:nvPicPr>
+          <p:cNvPr id="4" name="Espace réservé du contenu 4">
+            <a:extLst>
+              <a:ext uri="{FF2B5EF4-FFF2-40B4-BE49-F238E27FC236}">
+                <a16:creationId xmlns:a16="http://schemas.microsoft.com/office/drawing/2014/main" id="{EFBED685-8B33-4694-861C-325FB3929A2D}"/>
+              </a:ext>
+            </a:extLst>
+          </p:cNvPr>
+          <p:cNvPicPr>
+            <a:picLocks noChangeAspect="1"/>
+          </p:cNvPicPr>
+          <p:nvPr/>
+        </p:nvPicPr>
+        <p:blipFill>
+          <a:blip r:embed="rId2" cstate="print">
+            <a:extLst>
+              <a:ext uri="{28A0092B-C50C-407E-A947-70E740481C1C}">
+                <a14:useLocalDpi xmlns:a14="http://schemas.microsoft.com/office/drawing/2010/main" val="0"/>
+              </a:ext>
+            </a:extLst>
+          </a:blip>
+          <a:stretch>
+            <a:fillRect/>
+          </a:stretch>
+        </p:blipFill>
+        <p:spPr>
+          <a:xfrm>
+            <a:off x="7455625" y="6318665"/>
+            <a:ext cx="616018" cy="616018"/>
+          </a:xfrm>
+          <a:prstGeom prst="rect">
+            <a:avLst/>
+          </a:prstGeom>
+        </p:spPr>
+      </p:pic>
+      <p:sp>
+        <p:nvSpPr>
+          <p:cNvPr id="5" name="ZoneTexte 4">
+            <a:extLst>
+              <a:ext uri="{FF2B5EF4-FFF2-40B4-BE49-F238E27FC236}">
+                <a16:creationId xmlns:a16="http://schemas.microsoft.com/office/drawing/2014/main" id="{D352F6DE-74E1-483E-B67D-F979EBF3A6E5}"/>
+              </a:ext>
+            </a:extLst>
+          </p:cNvPr>
+          <p:cNvSpPr txBox="1"/>
+          <p:nvPr/>
+        </p:nvSpPr>
+        <p:spPr>
+          <a:xfrm>
+            <a:off x="1693094" y="6442008"/>
+            <a:ext cx="1068371" cy="369332"/>
+          </a:xfrm>
+          <a:prstGeom prst="rect">
+            <a:avLst/>
+          </a:prstGeom>
+          <a:noFill/>
+        </p:spPr>
+        <p:txBody>
+          <a:bodyPr wrap="square" rtlCol="0">
+            <a:spAutoFit/>
+          </a:bodyPr>
+          <a:lstStyle/>
+          <a:p>
+            <a:pPr algn="just"/>
+            <a:r>
+              <a:rPr lang="fr-FR" dirty="0">
+                <a:latin typeface="Agency FB" panose="020B0503020202020204" pitchFamily="34" charset="0"/>
+              </a:rPr>
+              <a:t>Introduction</a:t>
+            </a:r>
+          </a:p>
+        </p:txBody>
+      </p:sp>
+      <p:sp>
+        <p:nvSpPr>
+          <p:cNvPr id="6" name="ZoneTexte 5">
+            <a:extLst>
+              <a:ext uri="{FF2B5EF4-FFF2-40B4-BE49-F238E27FC236}">
+                <a16:creationId xmlns:a16="http://schemas.microsoft.com/office/drawing/2014/main" id="{81D86E08-6339-4383-8325-EDAB76A83C54}"/>
+              </a:ext>
+            </a:extLst>
+          </p:cNvPr>
+          <p:cNvSpPr txBox="1"/>
+          <p:nvPr/>
+        </p:nvSpPr>
+        <p:spPr>
+          <a:xfrm>
+            <a:off x="3409930" y="6442008"/>
+            <a:ext cx="2107024" cy="369332"/>
+          </a:xfrm>
+          <a:prstGeom prst="rect">
+            <a:avLst/>
+          </a:prstGeom>
+          <a:noFill/>
+        </p:spPr>
+        <p:txBody>
+          <a:bodyPr wrap="square" rtlCol="0">
+            <a:spAutoFit/>
+          </a:bodyPr>
+          <a:lstStyle/>
+          <a:p>
+            <a:pPr algn="just"/>
+            <a:r>
+              <a:rPr lang="fr-FR" dirty="0">
+                <a:latin typeface="Agency FB" panose="020B0503020202020204" pitchFamily="34" charset="0"/>
+              </a:rPr>
+              <a:t>Présentation de PROXIDEJ</a:t>
+            </a:r>
+          </a:p>
+        </p:txBody>
+      </p:sp>
+      <p:sp>
+        <p:nvSpPr>
+          <p:cNvPr id="7" name="ZoneTexte 6">
+            <a:extLst>
+              <a:ext uri="{FF2B5EF4-FFF2-40B4-BE49-F238E27FC236}">
+                <a16:creationId xmlns:a16="http://schemas.microsoft.com/office/drawing/2014/main" id="{C9A37364-4A84-47BF-A57F-321191E60553}"/>
+              </a:ext>
+            </a:extLst>
+          </p:cNvPr>
+          <p:cNvSpPr txBox="1"/>
+          <p:nvPr/>
+        </p:nvSpPr>
+        <p:spPr>
+          <a:xfrm>
+            <a:off x="6089564" y="6442008"/>
+            <a:ext cx="1409469" cy="369332"/>
+          </a:xfrm>
+          <a:prstGeom prst="rect">
+            <a:avLst/>
+          </a:prstGeom>
+          <a:noFill/>
+        </p:spPr>
+        <p:txBody>
+          <a:bodyPr wrap="square" rtlCol="0">
+            <a:spAutoFit/>
+          </a:bodyPr>
+          <a:lstStyle/>
+          <a:p>
+            <a:pPr algn="just"/>
+            <a:r>
+              <a:rPr lang="fr-FR" dirty="0">
+                <a:latin typeface="Agency FB" panose="020B0503020202020204" pitchFamily="34" charset="0"/>
+              </a:rPr>
+              <a:t>Projet en groupe</a:t>
+            </a:r>
+          </a:p>
+        </p:txBody>
+      </p:sp>
+      <p:sp>
+        <p:nvSpPr>
+          <p:cNvPr id="8" name="ZoneTexte 7">
+            <a:extLst>
+              <a:ext uri="{FF2B5EF4-FFF2-40B4-BE49-F238E27FC236}">
+                <a16:creationId xmlns:a16="http://schemas.microsoft.com/office/drawing/2014/main" id="{0122A37C-47EF-4B7C-BC12-8DABA46D1C2D}"/>
+              </a:ext>
+            </a:extLst>
+          </p:cNvPr>
+          <p:cNvSpPr txBox="1"/>
+          <p:nvPr/>
+        </p:nvSpPr>
+        <p:spPr>
+          <a:xfrm>
+            <a:off x="8071644" y="6442008"/>
+            <a:ext cx="1409468" cy="369332"/>
+          </a:xfrm>
+          <a:prstGeom prst="rect">
+            <a:avLst/>
+          </a:prstGeom>
+          <a:noFill/>
+        </p:spPr>
+        <p:txBody>
+          <a:bodyPr wrap="square" rtlCol="0">
+            <a:spAutoFit/>
+          </a:bodyPr>
+          <a:lstStyle/>
+          <a:p>
+            <a:pPr algn="just"/>
+            <a:r>
+              <a:rPr lang="fr-FR" dirty="0">
+                <a:latin typeface="Agency FB" panose="020B0503020202020204" pitchFamily="34" charset="0"/>
+              </a:rPr>
+              <a:t>Projet personnel</a:t>
+            </a:r>
+          </a:p>
+        </p:txBody>
+      </p:sp>
+      <p:sp>
+        <p:nvSpPr>
+          <p:cNvPr id="9" name="ZoneTexte 8">
+            <a:extLst>
+              <a:ext uri="{FF2B5EF4-FFF2-40B4-BE49-F238E27FC236}">
+                <a16:creationId xmlns:a16="http://schemas.microsoft.com/office/drawing/2014/main" id="{775A2C69-534C-4F39-AE40-F365CD14DDA9}"/>
+              </a:ext>
+            </a:extLst>
+          </p:cNvPr>
+          <p:cNvSpPr txBox="1"/>
+          <p:nvPr/>
+        </p:nvSpPr>
+        <p:spPr>
+          <a:xfrm>
+            <a:off x="10053722" y="6442008"/>
+            <a:ext cx="1040998" cy="369332"/>
+          </a:xfrm>
+          <a:prstGeom prst="rect">
+            <a:avLst/>
+          </a:prstGeom>
+          <a:noFill/>
+        </p:spPr>
+        <p:txBody>
+          <a:bodyPr wrap="square" rtlCol="0">
+            <a:spAutoFit/>
+          </a:bodyPr>
+          <a:lstStyle/>
+          <a:p>
+            <a:pPr algn="just"/>
+            <a:r>
+              <a:rPr lang="fr-FR" dirty="0">
+                <a:latin typeface="Agency FB" panose="020B0503020202020204" pitchFamily="34" charset="0"/>
+              </a:rPr>
+              <a:t>Conclusion</a:t>
+            </a:r>
+          </a:p>
+        </p:txBody>
+      </p:sp>
+    </p:spTree>
+    <p:extLst>
+      <p:ext uri="{BB962C8B-B14F-4D97-AF65-F5344CB8AC3E}">
+        <p14:creationId xmlns:p14="http://schemas.microsoft.com/office/powerpoint/2010/main" val="2357258378"/>
+      </p:ext>
+    </p:extLst>
+  </p:cSld>
+  <p:clrMapOvr>
+    <a:masterClrMapping/>
+  </p:clrMapOvr>
+  <p:timing>
+    <p:tnLst>
+      <p:par>
+        <p:cTn id="1" dur="indefinite" restart="never" nodeType="tmRoot">
+          <p:childTnLst>
+            <p:seq concurrent="1" nextAc="seek">
+              <p:cTn id="2" dur="indefinite" nodeType="mainSeq">
+                <p:childTnLst>
+                  <p:par>
+                    <p:cTn id="3" fill="hold">
+                      <p:stCondLst>
+                        <p:cond delay="indefinite"/>
+                      </p:stCondLst>
+                      <p:childTnLst>
+                        <p:par>
+                          <p:cTn id="4" fill="hold">
+                            <p:stCondLst>
+                              <p:cond delay="0"/>
+                            </p:stCondLst>
+                            <p:childTnLst>
+                              <p:par>
+                                <p:cTn id="5" presetID="63" presetClass="path" presetSubtype="0" accel="50000" decel="50000" fill="hold" nodeType="clickEffect">
+                                  <p:stCondLst>
+                                    <p:cond delay="0"/>
+                                  </p:stCondLst>
+                                  <p:childTnLst>
+                                    <p:animMotion origin="layout" path="M 1.25E-6 -3.7037E-6 L 0.16107 -3.7037E-6 " pathEditMode="relative" rAng="0" ptsTypes="AA">
+                                      <p:cBhvr>
+                                        <p:cTn id="6" dur="2000" fill="hold"/>
+                                        <p:tgtEl>
+                                          <p:spTgt spid="4"/>
+                                        </p:tgtEl>
+                                        <p:attrNameLst>
+                                          <p:attrName>ppt_x</p:attrName>
+                                          <p:attrName>ppt_y</p:attrName>
+                                        </p:attrNameLst>
+                                      </p:cBhvr>
+                                      <p:rCtr x="8047" y="0"/>
+                                    </p:animMotion>
+                                  </p:childTnLst>
+                                </p:cTn>
+                              </p:par>
+                            </p:childTnLst>
+                          </p:cTn>
+                        </p:par>
+                      </p:childTnLst>
+                    </p:cTn>
+                  </p:par>
+                </p:childTnLst>
+              </p:cTn>
+              <p:prevCondLst>
+                <p:cond evt="onPrev" delay="0">
+                  <p:tgtEl>
+                    <p:sldTgt/>
+                  </p:tgtEl>
+                </p:cond>
+              </p:prevCondLst>
+              <p:nextCondLst>
+                <p:cond evt="onNext" delay="0">
+                  <p:tgtEl>
+                    <p:sldTgt/>
+                  </p:tgtEl>
+                </p:cond>
+              </p:nextCondLst>
+            </p:seq>
+          </p:childTnLst>
+        </p:cTn>
+      </p:par>
+    </p:tnLst>
+  </p:timing>
+</p:sld>
+</file>
+
+<file path=ppt/slides/slide9.xml><?xml version="1.0" encoding="utf-8"?>
+<p:sld xmlns:a="http://schemas.openxmlformats.org/drawingml/2006/main" xmlns:r="http://schemas.openxmlformats.org/officeDocument/2006/relationships" xmlns:p="http://schemas.openxmlformats.org/presentationml/2006/main">
+  <p:cSld>
+    <p:spTree>
+      <p:nvGrpSpPr>
+        <p:cNvPr id="1" name=""/>
+        <p:cNvGrpSpPr/>
+        <p:nvPr/>
+      </p:nvGrpSpPr>
+      <p:grpSpPr>
+        <a:xfrm>
+          <a:off x="0" y="0"/>
+          <a:ext cx="0" cy="0"/>
+          <a:chOff x="0" y="0"/>
+          <a:chExt cx="0" cy="0"/>
+        </a:xfrm>
+      </p:grpSpPr>
+      <p:sp>
+        <p:nvSpPr>
+          <p:cNvPr id="2" name="Titre 1">
+            <a:extLst>
+              <a:ext uri="{FF2B5EF4-FFF2-40B4-BE49-F238E27FC236}">
+                <a16:creationId xmlns:a16="http://schemas.microsoft.com/office/drawing/2014/main" id="{5F56F51A-8228-488D-86B2-C8EF138BFDD9}"/>
+              </a:ext>
+            </a:extLst>
+          </p:cNvPr>
+          <p:cNvSpPr>
+            <a:spLocks noGrp="1"/>
+          </p:cNvSpPr>
+          <p:nvPr>
+            <p:ph type="title"/>
+          </p:nvPr>
+        </p:nvSpPr>
+        <p:spPr/>
+        <p:txBody>
+          <a:bodyPr/>
+          <a:lstStyle/>
+          <a:p>
+            <a:r>
+              <a:rPr lang="fr-FR" dirty="0"/>
+              <a:t>Conclusion</a:t>
+            </a:r>
+          </a:p>
+        </p:txBody>
+      </p:sp>
+      <p:sp>
+        <p:nvSpPr>
+          <p:cNvPr id="3" name="Espace réservé du contenu 2">
+            <a:extLst>
+              <a:ext uri="{FF2B5EF4-FFF2-40B4-BE49-F238E27FC236}">
+                <a16:creationId xmlns:a16="http://schemas.microsoft.com/office/drawing/2014/main" id="{0C822BFA-0C0C-4975-840E-E4397A52FB17}"/>
+              </a:ext>
+            </a:extLst>
+          </p:cNvPr>
+          <p:cNvSpPr>
+            <a:spLocks noGrp="1"/>
+          </p:cNvSpPr>
+          <p:nvPr>
+            <p:ph idx="1"/>
+          </p:nvPr>
+        </p:nvSpPr>
+        <p:spPr/>
+        <p:txBody>
+          <a:bodyPr/>
+          <a:lstStyle/>
+          <a:p>
+            <a:endParaRPr lang="fr-FR"/>
+          </a:p>
+        </p:txBody>
+      </p:sp>
+      <p:pic>
+        <p:nvPicPr>
+          <p:cNvPr id="4" name="Espace réservé du contenu 4">
+            <a:extLst>
+              <a:ext uri="{FF2B5EF4-FFF2-40B4-BE49-F238E27FC236}">
+                <a16:creationId xmlns:a16="http://schemas.microsoft.com/office/drawing/2014/main" id="{6BE7F347-8E6F-468F-B35A-4C9CF9A91ECD}"/>
+              </a:ext>
+            </a:extLst>
+          </p:cNvPr>
+          <p:cNvPicPr>
+            <a:picLocks noChangeAspect="1"/>
+          </p:cNvPicPr>
+          <p:nvPr/>
+        </p:nvPicPr>
+        <p:blipFill>
+          <a:blip r:embed="rId2" cstate="print">
+            <a:extLst>
+              <a:ext uri="{28A0092B-C50C-407E-A947-70E740481C1C}">
+                <a14:useLocalDpi xmlns:a14="http://schemas.microsoft.com/office/drawing/2010/main" val="0"/>
+              </a:ext>
+            </a:extLst>
+          </a:blip>
+          <a:stretch>
+            <a:fillRect/>
+          </a:stretch>
+        </p:blipFill>
+        <p:spPr>
+          <a:xfrm>
+            <a:off x="9437704" y="6318665"/>
+            <a:ext cx="616018" cy="616018"/>
+          </a:xfrm>
+          <a:prstGeom prst="rect">
+            <a:avLst/>
+          </a:prstGeom>
+        </p:spPr>
+      </p:pic>
+      <p:sp>
+        <p:nvSpPr>
+          <p:cNvPr id="5" name="ZoneTexte 4">
+            <a:extLst>
+              <a:ext uri="{FF2B5EF4-FFF2-40B4-BE49-F238E27FC236}">
+                <a16:creationId xmlns:a16="http://schemas.microsoft.com/office/drawing/2014/main" id="{ED9B02B8-4008-4EC6-A7A1-0DC6A64F1AB2}"/>
+              </a:ext>
+            </a:extLst>
+          </p:cNvPr>
+          <p:cNvSpPr txBox="1"/>
+          <p:nvPr/>
+        </p:nvSpPr>
+        <p:spPr>
+          <a:xfrm>
+            <a:off x="1693094" y="6442008"/>
+            <a:ext cx="1068371" cy="369332"/>
+          </a:xfrm>
+          <a:prstGeom prst="rect">
+            <a:avLst/>
+          </a:prstGeom>
+          <a:noFill/>
+        </p:spPr>
+        <p:txBody>
+          <a:bodyPr wrap="square" rtlCol="0">
+            <a:spAutoFit/>
+          </a:bodyPr>
+          <a:lstStyle/>
+          <a:p>
+            <a:pPr algn="just"/>
+            <a:r>
+              <a:rPr lang="fr-FR" dirty="0">
+                <a:latin typeface="Agency FB" panose="020B0503020202020204" pitchFamily="34" charset="0"/>
+              </a:rPr>
+              <a:t>Introduction</a:t>
+            </a:r>
+          </a:p>
+        </p:txBody>
+      </p:sp>
+      <p:sp>
+        <p:nvSpPr>
+          <p:cNvPr id="6" name="ZoneTexte 5">
+            <a:extLst>
+              <a:ext uri="{FF2B5EF4-FFF2-40B4-BE49-F238E27FC236}">
+                <a16:creationId xmlns:a16="http://schemas.microsoft.com/office/drawing/2014/main" id="{56A3C651-D503-4D2D-92D9-D818755649CA}"/>
+              </a:ext>
+            </a:extLst>
+          </p:cNvPr>
+          <p:cNvSpPr txBox="1"/>
+          <p:nvPr/>
+        </p:nvSpPr>
+        <p:spPr>
+          <a:xfrm>
+            <a:off x="3409930" y="6442008"/>
+            <a:ext cx="2107024" cy="369332"/>
+          </a:xfrm>
+          <a:prstGeom prst="rect">
+            <a:avLst/>
+          </a:prstGeom>
+          <a:noFill/>
+        </p:spPr>
+        <p:txBody>
+          <a:bodyPr wrap="square" rtlCol="0">
+            <a:spAutoFit/>
+          </a:bodyPr>
+          <a:lstStyle/>
+          <a:p>
+            <a:pPr algn="just"/>
+            <a:r>
+              <a:rPr lang="fr-FR" dirty="0">
+                <a:latin typeface="Agency FB" panose="020B0503020202020204" pitchFamily="34" charset="0"/>
+              </a:rPr>
+              <a:t>Présentation de PROXIDEJ</a:t>
+            </a:r>
+          </a:p>
+        </p:txBody>
+      </p:sp>
+      <p:sp>
+        <p:nvSpPr>
+          <p:cNvPr id="7" name="ZoneTexte 6">
+            <a:extLst>
+              <a:ext uri="{FF2B5EF4-FFF2-40B4-BE49-F238E27FC236}">
+                <a16:creationId xmlns:a16="http://schemas.microsoft.com/office/drawing/2014/main" id="{2A999787-6AF3-40AD-9F10-809786410FB5}"/>
+              </a:ext>
+            </a:extLst>
+          </p:cNvPr>
+          <p:cNvSpPr txBox="1"/>
+          <p:nvPr/>
+        </p:nvSpPr>
+        <p:spPr>
+          <a:xfrm>
+            <a:off x="6089564" y="6442008"/>
+            <a:ext cx="1409469" cy="369332"/>
+          </a:xfrm>
+          <a:prstGeom prst="rect">
+            <a:avLst/>
+          </a:prstGeom>
+          <a:noFill/>
+        </p:spPr>
+        <p:txBody>
+          <a:bodyPr wrap="square" rtlCol="0">
+            <a:spAutoFit/>
+          </a:bodyPr>
+          <a:lstStyle/>
+          <a:p>
+            <a:pPr algn="just"/>
+            <a:r>
+              <a:rPr lang="fr-FR" dirty="0">
+                <a:latin typeface="Agency FB" panose="020B0503020202020204" pitchFamily="34" charset="0"/>
+              </a:rPr>
+              <a:t>Projet en groupe</a:t>
+            </a:r>
+          </a:p>
+        </p:txBody>
+      </p:sp>
+      <p:sp>
+        <p:nvSpPr>
+          <p:cNvPr id="8" name="ZoneTexte 7">
+            <a:extLst>
+              <a:ext uri="{FF2B5EF4-FFF2-40B4-BE49-F238E27FC236}">
+                <a16:creationId xmlns:a16="http://schemas.microsoft.com/office/drawing/2014/main" id="{9AF224B5-A9FB-4843-840B-DF7AFA788510}"/>
+              </a:ext>
+            </a:extLst>
+          </p:cNvPr>
+          <p:cNvSpPr txBox="1"/>
+          <p:nvPr/>
+        </p:nvSpPr>
+        <p:spPr>
+          <a:xfrm>
+            <a:off x="8071644" y="6442008"/>
+            <a:ext cx="1409468" cy="369332"/>
+          </a:xfrm>
+          <a:prstGeom prst="rect">
+            <a:avLst/>
+          </a:prstGeom>
+          <a:noFill/>
+        </p:spPr>
+        <p:txBody>
+          <a:bodyPr wrap="square" rtlCol="0">
+            <a:spAutoFit/>
+          </a:bodyPr>
+          <a:lstStyle/>
+          <a:p>
+            <a:pPr algn="just"/>
+            <a:r>
+              <a:rPr lang="fr-FR" dirty="0">
+                <a:latin typeface="Agency FB" panose="020B0503020202020204" pitchFamily="34" charset="0"/>
+              </a:rPr>
+              <a:t>Projet personnel</a:t>
+            </a:r>
+          </a:p>
+        </p:txBody>
+      </p:sp>
+      <p:sp>
+        <p:nvSpPr>
+          <p:cNvPr id="9" name="ZoneTexte 8">
+            <a:extLst>
+              <a:ext uri="{FF2B5EF4-FFF2-40B4-BE49-F238E27FC236}">
+                <a16:creationId xmlns:a16="http://schemas.microsoft.com/office/drawing/2014/main" id="{F47E9ADC-3D8A-4C37-9C8A-7ABA36CA8C24}"/>
+              </a:ext>
+            </a:extLst>
+          </p:cNvPr>
+          <p:cNvSpPr txBox="1"/>
+          <p:nvPr/>
+        </p:nvSpPr>
+        <p:spPr>
+          <a:xfrm>
+            <a:off x="10053722" y="6442008"/>
+            <a:ext cx="1040998" cy="369332"/>
+          </a:xfrm>
+          <a:prstGeom prst="rect">
+            <a:avLst/>
+          </a:prstGeom>
+          <a:noFill/>
+        </p:spPr>
+        <p:txBody>
+          <a:bodyPr wrap="square" rtlCol="0">
+            <a:spAutoFit/>
+          </a:bodyPr>
+          <a:lstStyle/>
+          <a:p>
+            <a:pPr algn="just"/>
+            <a:r>
+              <a:rPr lang="fr-FR" dirty="0">
+                <a:latin typeface="Agency FB" panose="020B0503020202020204" pitchFamily="34" charset="0"/>
+              </a:rPr>
+              <a:t>Conclusion</a:t>
+            </a:r>
+          </a:p>
+        </p:txBody>
+      </p:sp>
+    </p:spTree>
+    <p:extLst>
+      <p:ext uri="{BB962C8B-B14F-4D97-AF65-F5344CB8AC3E}">
+        <p14:creationId xmlns:p14="http://schemas.microsoft.com/office/powerpoint/2010/main" val="1948630671"/>
       </p:ext>
     </p:extLst>
   </p:cSld>

</xml_diff>

<commit_message>
Suppression Diapo et modification du chemin de fer
</commit_message>
<xml_diff>
--- a/Diaporama/DIAPO_01.pptx
+++ b/Diaporama/DIAPO_01.pptx
@@ -3570,7 +3570,7 @@
           <a:p>
             <a:fld id="{2BE451C3-0FF4-47C4-B829-773ADF60F88C}" type="datetimeFigureOut">
               <a:rPr lang="en-US" smtClean="0"/>
-              <a:t>1/22/2020</a:t>
+              <a:t>1/28/2020</a:t>
             </a:fld>
             <a:endParaRPr lang="en-US" dirty="0"/>
           </a:p>
@@ -3785,7 +3785,7 @@
           <a:p>
             <a:fld id="{2BE451C3-0FF4-47C4-B829-773ADF60F88C}" type="datetimeFigureOut">
               <a:rPr lang="en-US" smtClean="0"/>
-              <a:t>1/22/2020</a:t>
+              <a:t>1/28/2020</a:t>
             </a:fld>
             <a:endParaRPr lang="en-US" dirty="0"/>
           </a:p>
@@ -4048,7 +4048,7 @@
           <a:p>
             <a:fld id="{2BE451C3-0FF4-47C4-B829-773ADF60F88C}" type="datetimeFigureOut">
               <a:rPr lang="en-US" smtClean="0"/>
-              <a:t>1/22/2020</a:t>
+              <a:t>1/28/2020</a:t>
             </a:fld>
             <a:endParaRPr lang="en-US" dirty="0"/>
           </a:p>
@@ -4229,7 +4229,7 @@
           <a:p>
             <a:fld id="{2BE451C3-0FF4-47C4-B829-773ADF60F88C}" type="datetimeFigureOut">
               <a:rPr lang="en-US" smtClean="0"/>
-              <a:t>1/22/2020</a:t>
+              <a:t>1/28/2020</a:t>
             </a:fld>
             <a:endParaRPr lang="en-US" dirty="0"/>
           </a:p>
@@ -4579,7 +4579,7 @@
           <a:p>
             <a:fld id="{2BE451C3-0FF4-47C4-B829-773ADF60F88C}" type="datetimeFigureOut">
               <a:rPr lang="en-US" smtClean="0"/>
-              <a:t>1/22/2020</a:t>
+              <a:t>1/28/2020</a:t>
             </a:fld>
             <a:endParaRPr lang="en-US" dirty="0"/>
           </a:p>
@@ -4861,7 +4861,7 @@
           <a:p>
             <a:fld id="{2BE451C3-0FF4-47C4-B829-773ADF60F88C}" type="datetimeFigureOut">
               <a:rPr lang="en-US" smtClean="0"/>
-              <a:t>1/22/2020</a:t>
+              <a:t>1/28/2020</a:t>
             </a:fld>
             <a:endParaRPr lang="en-US" dirty="0"/>
           </a:p>
@@ -5247,7 +5247,7 @@
           <a:p>
             <a:fld id="{2BE451C3-0FF4-47C4-B829-773ADF60F88C}" type="datetimeFigureOut">
               <a:rPr lang="en-US" smtClean="0"/>
-              <a:t>1/22/2020</a:t>
+              <a:t>1/28/2020</a:t>
             </a:fld>
             <a:endParaRPr lang="en-US" dirty="0"/>
           </a:p>
@@ -5372,7 +5372,7 @@
           <a:p>
             <a:fld id="{2BE451C3-0FF4-47C4-B829-773ADF60F88C}" type="datetimeFigureOut">
               <a:rPr lang="en-US" smtClean="0"/>
-              <a:t>1/22/2020</a:t>
+              <a:t>1/28/2020</a:t>
             </a:fld>
             <a:endParaRPr lang="en-US" dirty="0"/>
           </a:p>
@@ -5550,7 +5550,7 @@
           <a:p>
             <a:fld id="{2BE451C3-0FF4-47C4-B829-773ADF60F88C}" type="datetimeFigureOut">
               <a:rPr lang="en-US" smtClean="0"/>
-              <a:t>1/22/2020</a:t>
+              <a:t>1/28/2020</a:t>
             </a:fld>
             <a:endParaRPr lang="en-US" dirty="0"/>
           </a:p>
@@ -5911,7 +5911,7 @@
           <a:p>
             <a:fld id="{2BE451C3-0FF4-47C4-B829-773ADF60F88C}" type="datetimeFigureOut">
               <a:rPr lang="en-US" smtClean="0"/>
-              <a:t>1/22/2020</a:t>
+              <a:t>1/28/2020</a:t>
             </a:fld>
             <a:endParaRPr lang="en-US" dirty="0"/>
           </a:p>
@@ -6300,7 +6300,7 @@
           <a:p>
             <a:fld id="{2BE451C3-0FF4-47C4-B829-773ADF60F88C}" type="datetimeFigureOut">
               <a:rPr lang="en-US" smtClean="0"/>
-              <a:t>1/22/2020</a:t>
+              <a:t>1/28/2020</a:t>
             </a:fld>
             <a:endParaRPr lang="en-US" dirty="0"/>
           </a:p>
@@ -6594,7 +6594,7 @@
           <a:p>
             <a:fld id="{2BE451C3-0FF4-47C4-B829-773ADF60F88C}" type="datetimeFigureOut">
               <a:rPr lang="en-US" smtClean="0"/>
-              <a:t>1/22/2020</a:t>
+              <a:t>1/28/2020</a:t>
             </a:fld>
             <a:endParaRPr lang="en-US" dirty="0"/>
           </a:p>
@@ -7274,13 +7274,13 @@
         </p:nvSpPr>
         <p:spPr>
           <a:xfrm>
-            <a:off x="6720377" y="1765362"/>
-            <a:ext cx="3509035" cy="3898900"/>
+            <a:off x="6720377" y="1689861"/>
+            <a:ext cx="5188907" cy="3898900"/>
           </a:xfrm>
         </p:spPr>
         <p:txBody>
           <a:bodyPr vert="horz" lIns="91440" tIns="45720" rIns="91440" bIns="45720" rtlCol="0">
-            <a:normAutofit fontScale="92500" lnSpcReduction="20000"/>
+            <a:normAutofit lnSpcReduction="10000"/>
           </a:bodyPr>
           <a:lstStyle/>
           <a:p>
@@ -7320,27 +7320,7 @@
                   <a:schemeClr val="tx1"/>
                 </a:solidFill>
               </a:rPr>
-              <a:t> :</a:t>
-            </a:r>
-          </a:p>
-          <a:p>
-            <a:pPr algn="l"/>
-            <a:r>
-              <a:rPr lang="en-US" dirty="0">
-                <a:ln>
-                  <a:solidFill>
-                    <a:srgbClr val="000000">
-                      <a:lumMod val="75000"/>
-                      <a:lumOff val="25000"/>
-                      <a:alpha val="10000"/>
-                    </a:srgbClr>
-                  </a:solidFill>
-                </a:ln>
-                <a:solidFill>
-                  <a:schemeClr val="tx1"/>
-                </a:solidFill>
-              </a:rPr>
-              <a:t> </a:t>
+              <a:t> : </a:t>
             </a:r>
             <a:r>
               <a:rPr lang="en-US" dirty="0" err="1">
@@ -7820,7 +7800,7 @@
         </p:blipFill>
         <p:spPr>
           <a:xfrm>
-            <a:off x="7455625" y="6318665"/>
+            <a:off x="5473546" y="6318665"/>
             <a:ext cx="616018" cy="616018"/>
           </a:xfrm>
           <a:prstGeom prst="rect">
@@ -8040,6 +8020,9 @@
                     <p:cTn id="3" fill="hold">
                       <p:stCondLst>
                         <p:cond delay="indefinite"/>
+                        <p:cond evt="onBegin" delay="0">
+                          <p:tn val="2"/>
+                        </p:cond>
                       </p:stCondLst>
                       <p:childTnLst>
                         <p:par>
@@ -8049,7 +8032,7 @@
                             </p:stCondLst>
                             <p:childTnLst>
                               <p:par>
-                                <p:cTn id="5" presetID="63" presetClass="path" presetSubtype="0" accel="50000" decel="50000" fill="hold" nodeType="clickEffect">
+                                <p:cTn id="5" presetID="63" presetClass="path" presetSubtype="0" accel="50000" decel="50000" fill="hold" nodeType="withEffect">
                                   <p:stCondLst>
                                     <p:cond delay="0"/>
                                   </p:stCondLst>
@@ -11759,6 +11742,9 @@
                     <p:cTn id="3" fill="hold">
                       <p:stCondLst>
                         <p:cond delay="indefinite"/>
+                        <p:cond evt="onBegin" delay="0">
+                          <p:tn val="2"/>
+                        </p:cond>
                       </p:stCondLst>
                       <p:childTnLst>
                         <p:par>
@@ -11768,7 +11754,7 @@
                             </p:stCondLst>
                             <p:childTnLst>
                               <p:par>
-                                <p:cTn id="5" presetID="63" presetClass="path" presetSubtype="0" accel="50000" decel="50000" fill="hold" nodeType="clickEffect">
+                                <p:cTn id="5" presetID="63" presetClass="path" presetSubtype="0" accel="50000" decel="50000" fill="hold" nodeType="withEffect">
                                   <p:stCondLst>
                                     <p:cond delay="0"/>
                                   </p:stCondLst>
@@ -12546,6 +12532,9 @@
                     <p:cTn id="3" fill="hold">
                       <p:stCondLst>
                         <p:cond delay="indefinite"/>
+                        <p:cond evt="onBegin" delay="0">
+                          <p:tn val="2"/>
+                        </p:cond>
                       </p:stCondLst>
                       <p:childTnLst>
                         <p:par>
@@ -12555,7 +12544,7 @@
                             </p:stCondLst>
                             <p:childTnLst>
                               <p:par>
-                                <p:cTn id="5" presetID="63" presetClass="path" presetSubtype="0" accel="50000" decel="50000" fill="hold" nodeType="clickEffect">
+                                <p:cTn id="5" presetID="63" presetClass="path" presetSubtype="0" accel="50000" decel="50000" fill="hold" nodeType="withEffect">
                                   <p:stCondLst>
                                     <p:cond delay="0"/>
                                   </p:stCondLst>
@@ -14131,76 +14120,6 @@
   <p:clrMapOvr>
     <a:masterClrMapping/>
   </p:clrMapOvr>
-  <p:timing>
-    <p:tnLst>
-      <p:par>
-        <p:cTn id="1" dur="indefinite" restart="never" nodeType="tmRoot">
-          <p:childTnLst>
-            <p:seq concurrent="1" nextAc="seek">
-              <p:cTn id="2" dur="indefinite" nodeType="mainSeq">
-                <p:childTnLst>
-                  <p:par>
-                    <p:cTn id="3" fill="hold">
-                      <p:stCondLst>
-                        <p:cond delay="indefinite"/>
-                      </p:stCondLst>
-                      <p:childTnLst>
-                        <p:par>
-                          <p:cTn id="4" fill="hold">
-                            <p:stCondLst>
-                              <p:cond delay="0"/>
-                            </p:stCondLst>
-                            <p:childTnLst>
-                              <p:par>
-                                <p:cTn id="5" presetID="63" presetClass="path" presetSubtype="0" accel="50000" decel="50000" fill="hold" nodeType="clickEffect">
-                                  <p:stCondLst>
-                                    <p:cond delay="0"/>
-                                  </p:stCondLst>
-                                  <p:childTnLst>
-                                    <p:animMotion origin="layout" path="M 1.25E-6 -3.7037E-6 L 0.16107 -3.7037E-6 " pathEditMode="relative" rAng="0" ptsTypes="AA">
-                                      <p:cBhvr>
-                                        <p:cTn id="6" dur="2000" fill="hold"/>
-                                        <p:tgtEl>
-                                          <p:spTgt spid="4"/>
-                                        </p:tgtEl>
-                                        <p:attrNameLst>
-                                          <p:attrName>ppt_x</p:attrName>
-                                          <p:attrName>ppt_y</p:attrName>
-                                        </p:attrNameLst>
-                                      </p:cBhvr>
-                                      <p:rCtr x="8047" y="0"/>
-                                    </p:animMotion>
-                                  </p:childTnLst>
-                                </p:cTn>
-                              </p:par>
-                            </p:childTnLst>
-                          </p:cTn>
-                        </p:par>
-                      </p:childTnLst>
-                    </p:cTn>
-                  </p:par>
-                </p:childTnLst>
-              </p:cTn>
-              <p:prevCondLst>
-                <p:cond evt="onPrev" delay="0">
-                  <p:tgtEl>
-                    <p:sldTgt/>
-                  </p:tgtEl>
-                </p:cond>
-              </p:prevCondLst>
-              <p:nextCondLst>
-                <p:cond evt="onNext" delay="0">
-                  <p:tgtEl>
-                    <p:sldTgt/>
-                  </p:tgtEl>
-                </p:cond>
-              </p:nextCondLst>
-            </p:seq>
-          </p:childTnLst>
-        </p:cTn>
-      </p:par>
-    </p:tnLst>
-  </p:timing>
 </p:sld>
 </file>
 
@@ -14277,7 +14196,7 @@
         </p:blipFill>
         <p:spPr>
           <a:xfrm>
-            <a:off x="5473546" y="6318665"/>
+            <a:off x="5495250" y="6318665"/>
             <a:ext cx="616018" cy="616018"/>
           </a:xfrm>
           <a:prstGeom prst="rect">
@@ -14521,76 +14440,6 @@
   <p:clrMapOvr>
     <a:masterClrMapping/>
   </p:clrMapOvr>
-  <p:timing>
-    <p:tnLst>
-      <p:par>
-        <p:cTn id="1" dur="indefinite" restart="never" nodeType="tmRoot">
-          <p:childTnLst>
-            <p:seq concurrent="1" nextAc="seek">
-              <p:cTn id="2" dur="indefinite" nodeType="mainSeq">
-                <p:childTnLst>
-                  <p:par>
-                    <p:cTn id="3" fill="hold">
-                      <p:stCondLst>
-                        <p:cond delay="indefinite"/>
-                      </p:stCondLst>
-                      <p:childTnLst>
-                        <p:par>
-                          <p:cTn id="4" fill="hold">
-                            <p:stCondLst>
-                              <p:cond delay="0"/>
-                            </p:stCondLst>
-                            <p:childTnLst>
-                              <p:par>
-                                <p:cTn id="5" presetID="63" presetClass="path" presetSubtype="0" accel="50000" decel="50000" fill="hold" nodeType="clickEffect">
-                                  <p:stCondLst>
-                                    <p:cond delay="0"/>
-                                  </p:stCondLst>
-                                  <p:childTnLst>
-                                    <p:animMotion origin="layout" path="M 1.25E-6 -3.7037E-6 L 0.16107 -3.7037E-6 " pathEditMode="relative" rAng="0" ptsTypes="AA">
-                                      <p:cBhvr>
-                                        <p:cTn id="6" dur="2000" fill="hold"/>
-                                        <p:tgtEl>
-                                          <p:spTgt spid="4"/>
-                                        </p:tgtEl>
-                                        <p:attrNameLst>
-                                          <p:attrName>ppt_x</p:attrName>
-                                          <p:attrName>ppt_y</p:attrName>
-                                        </p:attrNameLst>
-                                      </p:cBhvr>
-                                      <p:rCtr x="8047" y="0"/>
-                                    </p:animMotion>
-                                  </p:childTnLst>
-                                </p:cTn>
-                              </p:par>
-                            </p:childTnLst>
-                          </p:cTn>
-                        </p:par>
-                      </p:childTnLst>
-                    </p:cTn>
-                  </p:par>
-                </p:childTnLst>
-              </p:cTn>
-              <p:prevCondLst>
-                <p:cond evt="onPrev" delay="0">
-                  <p:tgtEl>
-                    <p:sldTgt/>
-                  </p:tgtEl>
-                </p:cond>
-              </p:prevCondLst>
-              <p:nextCondLst>
-                <p:cond evt="onNext" delay="0">
-                  <p:tgtEl>
-                    <p:sldTgt/>
-                  </p:tgtEl>
-                </p:cond>
-              </p:nextCondLst>
-            </p:seq>
-          </p:childTnLst>
-        </p:cTn>
-      </p:par>
-    </p:tnLst>
-  </p:timing>
 </p:sld>
 </file>
 

</xml_diff>

<commit_message>
Réglage chemin de fer
</commit_message>
<xml_diff>
--- a/Diaporama/DIAPO_01.pptx
+++ b/Diaporama/DIAPO_01.pptx
@@ -16,6 +16,7 @@
     <p:sldId id="266" r:id="rId10"/>
     <p:sldId id="263" r:id="rId11"/>
     <p:sldId id="264" r:id="rId12"/>
+    <p:sldId id="267" r:id="rId13"/>
   </p:sldIdLst>
   <p:sldSz cx="12192000" cy="6858000"/>
   <p:notesSz cx="6858000" cy="9144000"/>
@@ -8124,7 +8125,7 @@
           <a:p>
             <a:r>
               <a:rPr lang="fr-FR" dirty="0"/>
-              <a:t>Conclusion</a:t>
+              <a:t>Présentation personnelle</a:t>
             </a:r>
           </a:p>
         </p:txBody>
@@ -8157,7 +8158,291 @@
         </p:blipFill>
         <p:spPr>
           <a:xfrm>
-            <a:off x="9437704" y="6318665"/>
+            <a:off x="7499033" y="6318665"/>
+            <a:ext cx="616018" cy="616018"/>
+          </a:xfrm>
+          <a:prstGeom prst="rect">
+            <a:avLst/>
+          </a:prstGeom>
+        </p:spPr>
+      </p:pic>
+      <p:sp>
+        <p:nvSpPr>
+          <p:cNvPr id="5" name="ZoneTexte 4">
+            <a:extLst>
+              <a:ext uri="{FF2B5EF4-FFF2-40B4-BE49-F238E27FC236}">
+                <a16:creationId xmlns:a16="http://schemas.microsoft.com/office/drawing/2014/main" id="{ED9B02B8-4008-4EC6-A7A1-0DC6A64F1AB2}"/>
+              </a:ext>
+            </a:extLst>
+          </p:cNvPr>
+          <p:cNvSpPr txBox="1"/>
+          <p:nvPr/>
+        </p:nvSpPr>
+        <p:spPr>
+          <a:xfrm>
+            <a:off x="1693094" y="6442008"/>
+            <a:ext cx="1068371" cy="369332"/>
+          </a:xfrm>
+          <a:prstGeom prst="rect">
+            <a:avLst/>
+          </a:prstGeom>
+          <a:noFill/>
+        </p:spPr>
+        <p:txBody>
+          <a:bodyPr wrap="square" rtlCol="0">
+            <a:spAutoFit/>
+          </a:bodyPr>
+          <a:lstStyle/>
+          <a:p>
+            <a:pPr algn="just"/>
+            <a:r>
+              <a:rPr lang="fr-FR" dirty="0">
+                <a:latin typeface="Agency FB" panose="020B0503020202020204" pitchFamily="34" charset="0"/>
+              </a:rPr>
+              <a:t>Introduction</a:t>
+            </a:r>
+          </a:p>
+        </p:txBody>
+      </p:sp>
+      <p:sp>
+        <p:nvSpPr>
+          <p:cNvPr id="6" name="ZoneTexte 5">
+            <a:extLst>
+              <a:ext uri="{FF2B5EF4-FFF2-40B4-BE49-F238E27FC236}">
+                <a16:creationId xmlns:a16="http://schemas.microsoft.com/office/drawing/2014/main" id="{56A3C651-D503-4D2D-92D9-D818755649CA}"/>
+              </a:ext>
+            </a:extLst>
+          </p:cNvPr>
+          <p:cNvSpPr txBox="1"/>
+          <p:nvPr/>
+        </p:nvSpPr>
+        <p:spPr>
+          <a:xfrm>
+            <a:off x="3409930" y="6442008"/>
+            <a:ext cx="2107024" cy="369332"/>
+          </a:xfrm>
+          <a:prstGeom prst="rect">
+            <a:avLst/>
+          </a:prstGeom>
+          <a:noFill/>
+        </p:spPr>
+        <p:txBody>
+          <a:bodyPr wrap="square" rtlCol="0">
+            <a:spAutoFit/>
+          </a:bodyPr>
+          <a:lstStyle/>
+          <a:p>
+            <a:pPr algn="just"/>
+            <a:r>
+              <a:rPr lang="fr-FR" dirty="0">
+                <a:latin typeface="Agency FB" panose="020B0503020202020204" pitchFamily="34" charset="0"/>
+              </a:rPr>
+              <a:t>Présentation de PROXIDEJ</a:t>
+            </a:r>
+          </a:p>
+        </p:txBody>
+      </p:sp>
+      <p:sp>
+        <p:nvSpPr>
+          <p:cNvPr id="7" name="ZoneTexte 6">
+            <a:extLst>
+              <a:ext uri="{FF2B5EF4-FFF2-40B4-BE49-F238E27FC236}">
+                <a16:creationId xmlns:a16="http://schemas.microsoft.com/office/drawing/2014/main" id="{2A999787-6AF3-40AD-9F10-809786410FB5}"/>
+              </a:ext>
+            </a:extLst>
+          </p:cNvPr>
+          <p:cNvSpPr txBox="1"/>
+          <p:nvPr/>
+        </p:nvSpPr>
+        <p:spPr>
+          <a:xfrm>
+            <a:off x="6089564" y="6442008"/>
+            <a:ext cx="1409469" cy="369332"/>
+          </a:xfrm>
+          <a:prstGeom prst="rect">
+            <a:avLst/>
+          </a:prstGeom>
+          <a:noFill/>
+        </p:spPr>
+        <p:txBody>
+          <a:bodyPr wrap="square" rtlCol="0">
+            <a:spAutoFit/>
+          </a:bodyPr>
+          <a:lstStyle/>
+          <a:p>
+            <a:pPr algn="just"/>
+            <a:r>
+              <a:rPr lang="fr-FR" dirty="0">
+                <a:latin typeface="Agency FB" panose="020B0503020202020204" pitchFamily="34" charset="0"/>
+              </a:rPr>
+              <a:t>Projet en groupe</a:t>
+            </a:r>
+          </a:p>
+        </p:txBody>
+      </p:sp>
+      <p:sp>
+        <p:nvSpPr>
+          <p:cNvPr id="8" name="ZoneTexte 7">
+            <a:extLst>
+              <a:ext uri="{FF2B5EF4-FFF2-40B4-BE49-F238E27FC236}">
+                <a16:creationId xmlns:a16="http://schemas.microsoft.com/office/drawing/2014/main" id="{9AF224B5-A9FB-4843-840B-DF7AFA788510}"/>
+              </a:ext>
+            </a:extLst>
+          </p:cNvPr>
+          <p:cNvSpPr txBox="1"/>
+          <p:nvPr/>
+        </p:nvSpPr>
+        <p:spPr>
+          <a:xfrm>
+            <a:off x="8071644" y="6442008"/>
+            <a:ext cx="1409468" cy="369332"/>
+          </a:xfrm>
+          <a:prstGeom prst="rect">
+            <a:avLst/>
+          </a:prstGeom>
+          <a:noFill/>
+        </p:spPr>
+        <p:txBody>
+          <a:bodyPr wrap="square" rtlCol="0">
+            <a:spAutoFit/>
+          </a:bodyPr>
+          <a:lstStyle/>
+          <a:p>
+            <a:pPr algn="just"/>
+            <a:r>
+              <a:rPr lang="fr-FR" dirty="0">
+                <a:latin typeface="Agency FB" panose="020B0503020202020204" pitchFamily="34" charset="0"/>
+              </a:rPr>
+              <a:t>Projet personnel</a:t>
+            </a:r>
+          </a:p>
+        </p:txBody>
+      </p:sp>
+      <p:sp>
+        <p:nvSpPr>
+          <p:cNvPr id="9" name="ZoneTexte 8">
+            <a:extLst>
+              <a:ext uri="{FF2B5EF4-FFF2-40B4-BE49-F238E27FC236}">
+                <a16:creationId xmlns:a16="http://schemas.microsoft.com/office/drawing/2014/main" id="{F47E9ADC-3D8A-4C37-9C8A-7ABA36CA8C24}"/>
+              </a:ext>
+            </a:extLst>
+          </p:cNvPr>
+          <p:cNvSpPr txBox="1"/>
+          <p:nvPr/>
+        </p:nvSpPr>
+        <p:spPr>
+          <a:xfrm>
+            <a:off x="10053722" y="6442008"/>
+            <a:ext cx="1040998" cy="369332"/>
+          </a:xfrm>
+          <a:prstGeom prst="rect">
+            <a:avLst/>
+          </a:prstGeom>
+          <a:noFill/>
+        </p:spPr>
+        <p:txBody>
+          <a:bodyPr wrap="square" rtlCol="0">
+            <a:spAutoFit/>
+          </a:bodyPr>
+          <a:lstStyle/>
+          <a:p>
+            <a:pPr algn="just"/>
+            <a:r>
+              <a:rPr lang="fr-FR" dirty="0">
+                <a:latin typeface="Agency FB" panose="020B0503020202020204" pitchFamily="34" charset="0"/>
+              </a:rPr>
+              <a:t>Conclusion</a:t>
+            </a:r>
+          </a:p>
+        </p:txBody>
+      </p:sp>
+    </p:spTree>
+    <p:extLst>
+      <p:ext uri="{BB962C8B-B14F-4D97-AF65-F5344CB8AC3E}">
+        <p14:creationId xmlns:p14="http://schemas.microsoft.com/office/powerpoint/2010/main" val="1948630671"/>
+      </p:ext>
+    </p:extLst>
+  </p:cSld>
+  <p:clrMapOvr>
+    <a:masterClrMapping/>
+  </p:clrMapOvr>
+</p:sld>
+</file>
+
+<file path=ppt/slides/slide12.xml><?xml version="1.0" encoding="utf-8"?>
+<p:sld xmlns:a="http://schemas.openxmlformats.org/drawingml/2006/main" xmlns:r="http://schemas.openxmlformats.org/officeDocument/2006/relationships" xmlns:p="http://schemas.openxmlformats.org/presentationml/2006/main">
+  <p:cSld>
+    <p:spTree>
+      <p:nvGrpSpPr>
+        <p:cNvPr id="1" name=""/>
+        <p:cNvGrpSpPr/>
+        <p:nvPr/>
+      </p:nvGrpSpPr>
+      <p:grpSpPr>
+        <a:xfrm>
+          <a:off x="0" y="0"/>
+          <a:ext cx="0" cy="0"/>
+          <a:chOff x="0" y="0"/>
+          <a:chExt cx="0" cy="0"/>
+        </a:xfrm>
+      </p:grpSpPr>
+      <p:sp>
+        <p:nvSpPr>
+          <p:cNvPr id="2" name="Titre 1">
+            <a:extLst>
+              <a:ext uri="{FF2B5EF4-FFF2-40B4-BE49-F238E27FC236}">
+                <a16:creationId xmlns:a16="http://schemas.microsoft.com/office/drawing/2014/main" id="{5F56F51A-8228-488D-86B2-C8EF138BFDD9}"/>
+              </a:ext>
+            </a:extLst>
+          </p:cNvPr>
+          <p:cNvSpPr>
+            <a:spLocks noGrp="1"/>
+          </p:cNvSpPr>
+          <p:nvPr>
+            <p:ph type="title"/>
+          </p:nvPr>
+        </p:nvSpPr>
+        <p:spPr/>
+        <p:txBody>
+          <a:bodyPr/>
+          <a:lstStyle/>
+          <a:p>
+            <a:r>
+              <a:rPr lang="fr-FR" dirty="0"/>
+              <a:t>Conclusion</a:t>
+            </a:r>
+          </a:p>
+        </p:txBody>
+      </p:sp>
+      <p:pic>
+        <p:nvPicPr>
+          <p:cNvPr id="4" name="Espace réservé du contenu 4">
+            <a:extLst>
+              <a:ext uri="{FF2B5EF4-FFF2-40B4-BE49-F238E27FC236}">
+                <a16:creationId xmlns:a16="http://schemas.microsoft.com/office/drawing/2014/main" id="{6BE7F347-8E6F-468F-B35A-4C9CF9A91ECD}"/>
+              </a:ext>
+            </a:extLst>
+          </p:cNvPr>
+          <p:cNvPicPr>
+            <a:picLocks noChangeAspect="1"/>
+          </p:cNvPicPr>
+          <p:nvPr/>
+        </p:nvPicPr>
+        <p:blipFill>
+          <a:blip r:embed="rId2" cstate="print">
+            <a:extLst>
+              <a:ext uri="{28A0092B-C50C-407E-A947-70E740481C1C}">
+                <a14:useLocalDpi xmlns:a14="http://schemas.microsoft.com/office/drawing/2010/main" val="0"/>
+              </a:ext>
+            </a:extLst>
+          </a:blip>
+          <a:stretch>
+            <a:fillRect/>
+          </a:stretch>
+        </p:blipFill>
+        <p:spPr>
+          <a:xfrm>
+            <a:off x="7499033" y="6318665"/>
             <a:ext cx="616018" cy="616018"/>
           </a:xfrm>
           <a:prstGeom prst="rect">
@@ -8430,13 +8715,83 @@
     </p:spTree>
     <p:extLst>
       <p:ext uri="{BB962C8B-B14F-4D97-AF65-F5344CB8AC3E}">
-        <p14:creationId xmlns:p14="http://schemas.microsoft.com/office/powerpoint/2010/main" val="1948630671"/>
+        <p14:creationId xmlns:p14="http://schemas.microsoft.com/office/powerpoint/2010/main" val="100014433"/>
       </p:ext>
     </p:extLst>
   </p:cSld>
   <p:clrMapOvr>
     <a:masterClrMapping/>
   </p:clrMapOvr>
+  <p:timing>
+    <p:tnLst>
+      <p:par>
+        <p:cTn id="1" dur="indefinite" restart="never" nodeType="tmRoot">
+          <p:childTnLst>
+            <p:seq concurrent="1" nextAc="seek">
+              <p:cTn id="2" dur="indefinite" nodeType="mainSeq">
+                <p:childTnLst>
+                  <p:par>
+                    <p:cTn id="3" fill="hold">
+                      <p:stCondLst>
+                        <p:cond delay="indefinite"/>
+                      </p:stCondLst>
+                      <p:childTnLst>
+                        <p:par>
+                          <p:cTn id="4" fill="hold">
+                            <p:stCondLst>
+                              <p:cond delay="0"/>
+                            </p:stCondLst>
+                            <p:childTnLst>
+                              <p:par>
+                                <p:cTn id="5" presetID="63" presetClass="path" presetSubtype="0" accel="50000" decel="50000" fill="hold" nodeType="clickEffect">
+                                  <p:stCondLst>
+                                    <p:cond delay="0"/>
+                                  </p:stCondLst>
+                                  <p:childTnLst>
+                                    <p:animMotion origin="layout" path="M -4.58333E-6 -3.7037E-6 L 0.1599 -3.7037E-6 " pathEditMode="relative" rAng="0" ptsTypes="AA">
+                                      <p:cBhvr>
+                                        <p:cTn id="6" dur="2000" fill="hold"/>
+                                        <p:tgtEl>
+                                          <p:spTgt spid="4"/>
+                                        </p:tgtEl>
+                                        <p:attrNameLst>
+                                          <p:attrName>ppt_x</p:attrName>
+                                          <p:attrName>ppt_y</p:attrName>
+                                        </p:attrNameLst>
+                                      </p:cBhvr>
+                                      <p:rCtr x="7995" y="0"/>
+                                    </p:animMotion>
+                                  </p:childTnLst>
+                                </p:cTn>
+                              </p:par>
+                            </p:childTnLst>
+                          </p:cTn>
+                        </p:par>
+                      </p:childTnLst>
+                    </p:cTn>
+                  </p:par>
+                </p:childTnLst>
+              </p:cTn>
+              <p:prevCondLst>
+                <p:cond evt="onPrev" delay="0">
+                  <p:tgtEl>
+                    <p:sldTgt/>
+                  </p:tgtEl>
+                </p:cond>
+              </p:prevCondLst>
+              <p:nextCondLst>
+                <p:cond evt="onNext" delay="0">
+                  <p:tgtEl>
+                    <p:sldTgt/>
+                  </p:tgtEl>
+                </p:cond>
+              </p:nextCondLst>
+            </p:seq>
+          </p:childTnLst>
+        </p:cTn>
+      </p:par>
+    </p:tnLst>
+  </p:timing>
 </p:sld>
 </file>
 
@@ -9709,46 +10064,6 @@
                                         <p:strVal val="visible"/>
                                       </p:to>
                                     </p:set>
-                                  </p:childTnLst>
-                                </p:cTn>
-                              </p:par>
-                            </p:childTnLst>
-                          </p:cTn>
-                        </p:par>
-                      </p:childTnLst>
-                    </p:cTn>
-                  </p:par>
-                  <p:par>
-                    <p:cTn id="9" fill="hold">
-                      <p:stCondLst>
-                        <p:cond delay="indefinite"/>
-                      </p:stCondLst>
-                      <p:childTnLst>
-                        <p:par>
-                          <p:cTn id="10" fill="hold">
-                            <p:stCondLst>
-                              <p:cond delay="0"/>
-                            </p:stCondLst>
-                            <p:childTnLst>
-                              <p:par>
-                                <p:cTn id="11" presetID="63" presetClass="path" presetSubtype="0" accel="50000" decel="50000" fill="hold" nodeType="clickEffect">
-                                  <p:stCondLst>
-                                    <p:cond delay="0"/>
-                                  </p:stCondLst>
-                                  <p:childTnLst>
-                                    <p:animMotion origin="layout" path="M -0.00312 -3.7037E-6 L 0.13919 -3.7037E-6 " pathEditMode="relative" rAng="0" ptsTypes="AA">
-                                      <p:cBhvr>
-                                        <p:cTn id="12" dur="2000" fill="hold"/>
-                                        <p:tgtEl>
-                                          <p:spTgt spid="9"/>
-                                        </p:tgtEl>
-                                        <p:attrNameLst>
-                                          <p:attrName>ppt_x</p:attrName>
-                                          <p:attrName>ppt_y</p:attrName>
-                                        </p:attrNameLst>
-                                      </p:cBhvr>
-                                      <p:rCtr x="7109" y="0"/>
-                                    </p:animMotion>
                                   </p:childTnLst>
                                 </p:cTn>
                               </p:par>
@@ -11715,7 +12030,7 @@
         </p:blipFill>
         <p:spPr>
           <a:xfrm>
-            <a:off x="2777688" y="6318665"/>
+            <a:off x="1120483" y="6318665"/>
             <a:ext cx="616018" cy="616018"/>
           </a:xfrm>
         </p:spPr>
@@ -11759,7 +12074,7 @@
                                     <p:cond delay="0"/>
                                   </p:stCondLst>
                                   <p:childTnLst>
-                                    <p:animMotion origin="layout" path="M 5E-6 -3.7037E-6 L 0.22188 -3.7037E-6 " pathEditMode="relative" rAng="0" ptsTypes="AA">
+                                    <p:animMotion origin="layout" path="M 2.5E-6 -3.7037E-6 L 0.13333 -3.7037E-6 " pathEditMode="relative" rAng="0" ptsTypes="AA">
                                       <p:cBhvr>
                                         <p:cTn id="6" dur="2000" fill="hold"/>
                                         <p:tgtEl>
@@ -11770,7 +12085,7 @@
                                           <p:attrName>ppt_y</p:attrName>
                                         </p:attrNameLst>
                                       </p:cBhvr>
-                                      <p:rCtr x="11094" y="0"/>
+                                      <p:rCtr x="6667" y="0"/>
                                     </p:animMotion>
                                   </p:childTnLst>
                                 </p:cTn>
@@ -12315,7 +12630,7 @@
         </p:blipFill>
         <p:spPr>
           <a:xfrm>
-            <a:off x="5473546" y="6318665"/>
+            <a:off x="2739761" y="6318665"/>
             <a:ext cx="616018" cy="616018"/>
           </a:xfrm>
         </p:spPr>
@@ -12549,7 +12864,7 @@
                                     <p:cond delay="0"/>
                                   </p:stCondLst>
                                   <p:childTnLst>
-                                    <p:animMotion origin="layout" path="M 1.25E-6 -3.7037E-6 L 0.16641 -3.7037E-6 " pathEditMode="relative" rAng="0" ptsTypes="AA">
+                                    <p:animMotion origin="layout" path="M 0 -3.7037E-6 L 0.22266 -3.7037E-6 " pathEditMode="relative" rAng="0" ptsTypes="AA">
                                       <p:cBhvr>
                                         <p:cTn id="6" dur="2000" fill="hold"/>
                                         <p:tgtEl>
@@ -12560,7 +12875,7 @@
                                           <p:attrName>ppt_y</p:attrName>
                                         </p:attrNameLst>
                                       </p:cBhvr>
-                                      <p:rCtr x="8320" y="0"/>
+                                      <p:rCtr x="11133" y="0"/>
                                     </p:animMotion>
                                   </p:childTnLst>
                                 </p:cTn>

</xml_diff>

<commit_message>
Ajout de l'export de la BDD et du maj diapo
</commit_message>
<xml_diff>
--- a/Diaporama/DIAPO_01.pptx
+++ b/Diaporama/DIAPO_01.pptx
@@ -121,14 +121,6 @@
     </p:ext>
   </p:extLst>
 </p:presentation>
-</file>
-
-<file path=ppt/revisionInfo.xml><?xml version="1.0" encoding="utf-8"?>
-<p1510:revInfo xmlns:a="http://schemas.openxmlformats.org/drawingml/2006/main" xmlns:r="http://schemas.openxmlformats.org/officeDocument/2006/relationships" xmlns:p1510="http://schemas.microsoft.com/office/powerpoint/2015/10/main">
-  <p1510:revLst>
-    <p1510:client id="{6F2C70D0-831B-4D6B-94B2-15AF5D001035}" v="433" dt="2020-01-14T09:33:21.654"/>
-  </p1510:revLst>
-</p1510:revInfo>
 </file>
 
 <file path=ppt/diagrams/colors1.xml><?xml version="1.0" encoding="utf-8"?>
@@ -3571,7 +3563,7 @@
           <a:p>
             <a:fld id="{2BE451C3-0FF4-47C4-B829-773ADF60F88C}" type="datetimeFigureOut">
               <a:rPr lang="en-US" smtClean="0"/>
-              <a:t>1/28/2020</a:t>
+              <a:t>1/29/2020</a:t>
             </a:fld>
             <a:endParaRPr lang="en-US" dirty="0"/>
           </a:p>
@@ -3786,7 +3778,7 @@
           <a:p>
             <a:fld id="{2BE451C3-0FF4-47C4-B829-773ADF60F88C}" type="datetimeFigureOut">
               <a:rPr lang="en-US" smtClean="0"/>
-              <a:t>1/28/2020</a:t>
+              <a:t>1/29/2020</a:t>
             </a:fld>
             <a:endParaRPr lang="en-US" dirty="0"/>
           </a:p>
@@ -4049,7 +4041,7 @@
           <a:p>
             <a:fld id="{2BE451C3-0FF4-47C4-B829-773ADF60F88C}" type="datetimeFigureOut">
               <a:rPr lang="en-US" smtClean="0"/>
-              <a:t>1/28/2020</a:t>
+              <a:t>1/29/2020</a:t>
             </a:fld>
             <a:endParaRPr lang="en-US" dirty="0"/>
           </a:p>
@@ -4230,7 +4222,7 @@
           <a:p>
             <a:fld id="{2BE451C3-0FF4-47C4-B829-773ADF60F88C}" type="datetimeFigureOut">
               <a:rPr lang="en-US" smtClean="0"/>
-              <a:t>1/28/2020</a:t>
+              <a:t>1/29/2020</a:t>
             </a:fld>
             <a:endParaRPr lang="en-US" dirty="0"/>
           </a:p>
@@ -4580,7 +4572,7 @@
           <a:p>
             <a:fld id="{2BE451C3-0FF4-47C4-B829-773ADF60F88C}" type="datetimeFigureOut">
               <a:rPr lang="en-US" smtClean="0"/>
-              <a:t>1/28/2020</a:t>
+              <a:t>1/29/2020</a:t>
             </a:fld>
             <a:endParaRPr lang="en-US" dirty="0"/>
           </a:p>
@@ -4862,7 +4854,7 @@
           <a:p>
             <a:fld id="{2BE451C3-0FF4-47C4-B829-773ADF60F88C}" type="datetimeFigureOut">
               <a:rPr lang="en-US" smtClean="0"/>
-              <a:t>1/28/2020</a:t>
+              <a:t>1/29/2020</a:t>
             </a:fld>
             <a:endParaRPr lang="en-US" dirty="0"/>
           </a:p>
@@ -5248,7 +5240,7 @@
           <a:p>
             <a:fld id="{2BE451C3-0FF4-47C4-B829-773ADF60F88C}" type="datetimeFigureOut">
               <a:rPr lang="en-US" smtClean="0"/>
-              <a:t>1/28/2020</a:t>
+              <a:t>1/29/2020</a:t>
             </a:fld>
             <a:endParaRPr lang="en-US" dirty="0"/>
           </a:p>
@@ -5373,7 +5365,7 @@
           <a:p>
             <a:fld id="{2BE451C3-0FF4-47C4-B829-773ADF60F88C}" type="datetimeFigureOut">
               <a:rPr lang="en-US" smtClean="0"/>
-              <a:t>1/28/2020</a:t>
+              <a:t>1/29/2020</a:t>
             </a:fld>
             <a:endParaRPr lang="en-US" dirty="0"/>
           </a:p>
@@ -5551,7 +5543,7 @@
           <a:p>
             <a:fld id="{2BE451C3-0FF4-47C4-B829-773ADF60F88C}" type="datetimeFigureOut">
               <a:rPr lang="en-US" smtClean="0"/>
-              <a:t>1/28/2020</a:t>
+              <a:t>1/29/2020</a:t>
             </a:fld>
             <a:endParaRPr lang="en-US" dirty="0"/>
           </a:p>
@@ -5912,7 +5904,7 @@
           <a:p>
             <a:fld id="{2BE451C3-0FF4-47C4-B829-773ADF60F88C}" type="datetimeFigureOut">
               <a:rPr lang="en-US" smtClean="0"/>
-              <a:t>1/28/2020</a:t>
+              <a:t>1/29/2020</a:t>
             </a:fld>
             <a:endParaRPr lang="en-US" dirty="0"/>
           </a:p>
@@ -6301,7 +6293,7 @@
           <a:p>
             <a:fld id="{2BE451C3-0FF4-47C4-B829-773ADF60F88C}" type="datetimeFigureOut">
               <a:rPr lang="en-US" smtClean="0"/>
-              <a:t>1/28/2020</a:t>
+              <a:t>1/29/2020</a:t>
             </a:fld>
             <a:endParaRPr lang="en-US" dirty="0"/>
           </a:p>
@@ -6595,7 +6587,7 @@
           <a:p>
             <a:fld id="{2BE451C3-0FF4-47C4-B829-773ADF60F88C}" type="datetimeFigureOut">
               <a:rPr lang="en-US" smtClean="0"/>
-              <a:t>1/28/2020</a:t>
+              <a:t>1/29/2020</a:t>
             </a:fld>
             <a:endParaRPr lang="en-US" dirty="0"/>
           </a:p>
@@ -7748,31 +7740,6 @@
           </a:p>
         </p:txBody>
       </p:sp>
-      <p:sp>
-        <p:nvSpPr>
-          <p:cNvPr id="3" name="Espace réservé du contenu 2">
-            <a:extLst>
-              <a:ext uri="{FF2B5EF4-FFF2-40B4-BE49-F238E27FC236}">
-                <a16:creationId xmlns:a16="http://schemas.microsoft.com/office/drawing/2014/main" id="{B4876BF3-9D0A-46E1-9ED3-5C2504859891}"/>
-              </a:ext>
-            </a:extLst>
-          </p:cNvPr>
-          <p:cNvSpPr>
-            <a:spLocks noGrp="1"/>
-          </p:cNvSpPr>
-          <p:nvPr>
-            <p:ph idx="1"/>
-          </p:nvPr>
-        </p:nvSpPr>
-        <p:spPr/>
-        <p:txBody>
-          <a:bodyPr/>
-          <a:lstStyle/>
-          <a:p>
-            <a:endParaRPr lang="fr-FR"/>
-          </a:p>
-        </p:txBody>
-      </p:sp>
       <p:pic>
         <p:nvPicPr>
           <p:cNvPr id="4" name="Espace réservé du contenu 4">
@@ -14478,7 +14445,7 @@
           <a:p>
             <a:r>
               <a:rPr lang="fr-FR" dirty="0"/>
-              <a:t>Diagramme de classe</a:t>
+              <a:t>Diagramme de cas d’utilisation</a:t>
             </a:r>
           </a:p>
         </p:txBody>
@@ -14711,10 +14678,10 @@
       </p:sp>
       <p:pic>
         <p:nvPicPr>
-          <p:cNvPr id="10" name="Image 9" descr="Une image contenant carte, texte&#10;&#10;Description générée automatiquement">
+          <p:cNvPr id="12" name="Image 11">
             <a:extLst>
               <a:ext uri="{FF2B5EF4-FFF2-40B4-BE49-F238E27FC236}">
-                <a16:creationId xmlns:a16="http://schemas.microsoft.com/office/drawing/2014/main" id="{F210B82A-9318-47B4-A960-31C19B17EBB8}"/>
+                <a16:creationId xmlns:a16="http://schemas.microsoft.com/office/drawing/2014/main" id="{4AD395AB-A6D5-46E9-BE82-434A0C631BAB}"/>
               </a:ext>
             </a:extLst>
           </p:cNvPr>
@@ -14724,21 +14691,15 @@
           <p:nvPr/>
         </p:nvPicPr>
         <p:blipFill>
-          <a:blip r:embed="rId3">
-            <a:extLst>
-              <a:ext uri="{28A0092B-C50C-407E-A947-70E740481C1C}">
-                <a14:useLocalDpi xmlns:a14="http://schemas.microsoft.com/office/drawing/2010/main" val="0"/>
-              </a:ext>
-            </a:extLst>
-          </a:blip>
+          <a:blip r:embed="rId3"/>
           <a:stretch>
             <a:fillRect/>
           </a:stretch>
         </p:blipFill>
         <p:spPr>
           <a:xfrm>
-            <a:off x="0" y="1775830"/>
-            <a:ext cx="12158975" cy="4171964"/>
+            <a:off x="2489309" y="1881636"/>
+            <a:ext cx="6055289" cy="4416095"/>
           </a:xfrm>
           <a:prstGeom prst="rect">
             <a:avLst/>

</xml_diff>